<commit_message>
+ Add high freq problems
</commit_message>
<xml_diff>
--- a/高频代码题解示意图.pptx
+++ b/高频代码题解示意图.pptx
@@ -5,7 +5,7 @@
     <p:sldMasterId id="2147483648" r:id="rId1"/>
   </p:sldMasterIdLst>
   <p:notesMasterIdLst>
-    <p:notesMasterId r:id="rId9"/>
+    <p:notesMasterId r:id="rId11"/>
   </p:notesMasterIdLst>
   <p:sldIdLst>
     <p:sldId id="256" r:id="rId2"/>
@@ -15,6 +15,8 @@
     <p:sldId id="262" r:id="rId6"/>
     <p:sldId id="263" r:id="rId7"/>
     <p:sldId id="264" r:id="rId8"/>
+    <p:sldId id="265" r:id="rId9"/>
+    <p:sldId id="266" r:id="rId10"/>
   </p:sldIdLst>
   <p:sldSz cx="12192000" cy="6858000"/>
   <p:notesSz cx="6858000" cy="9144000"/>
@@ -203,7 +205,7 @@
           <a:p>
             <a:fld id="{2C9F9DDE-F0A1-491D-8D69-0A4918BBC240}" type="datetimeFigureOut">
               <a:rPr lang="zh-CN" altLang="en-US" smtClean="0"/>
-              <a:t>2021/2/24</a:t>
+              <a:t>2021/2/27</a:t>
             </a:fld>
             <a:endParaRPr lang="zh-CN" altLang="en-US"/>
           </a:p>
@@ -1142,6 +1144,188 @@
 </p:notes>
 </file>
 
+<file path=ppt/notesSlides/notesSlide8.xml><?xml version="1.0" encoding="utf-8"?>
+<p:notes xmlns:a="http://schemas.openxmlformats.org/drawingml/2006/main" xmlns:r="http://schemas.openxmlformats.org/officeDocument/2006/relationships" xmlns:p="http://schemas.openxmlformats.org/presentationml/2006/main">
+  <p:cSld>
+    <p:spTree>
+      <p:nvGrpSpPr>
+        <p:cNvPr id="1" name=""/>
+        <p:cNvGrpSpPr/>
+        <p:nvPr/>
+      </p:nvGrpSpPr>
+      <p:grpSpPr>
+        <a:xfrm>
+          <a:off x="0" y="0"/>
+          <a:ext cx="0" cy="0"/>
+          <a:chOff x="0" y="0"/>
+          <a:chExt cx="0" cy="0"/>
+        </a:xfrm>
+      </p:grpSpPr>
+      <p:sp>
+        <p:nvSpPr>
+          <p:cNvPr id="2" name="幻灯片图像占位符 1"/>
+          <p:cNvSpPr>
+            <a:spLocks noGrp="1" noRot="1" noChangeAspect="1"/>
+          </p:cNvSpPr>
+          <p:nvPr>
+            <p:ph type="sldImg"/>
+          </p:nvPr>
+        </p:nvSpPr>
+        <p:spPr/>
+      </p:sp>
+      <p:sp>
+        <p:nvSpPr>
+          <p:cNvPr id="3" name="备注占位符 2"/>
+          <p:cNvSpPr>
+            <a:spLocks noGrp="1"/>
+          </p:cNvSpPr>
+          <p:nvPr>
+            <p:ph type="body" idx="1"/>
+          </p:nvPr>
+        </p:nvSpPr>
+        <p:spPr/>
+        <p:txBody>
+          <a:bodyPr/>
+          <a:lstStyle/>
+          <a:p>
+            <a:r>
+              <a:rPr lang="en-US" altLang="zh-CN" dirty="0"/>
+              <a:t>0003 </a:t>
+            </a:r>
+            <a:r>
+              <a:rPr lang="zh-CN" altLang="en-US" dirty="0"/>
+              <a:t>无重复字符的最长子串</a:t>
+            </a:r>
+          </a:p>
+        </p:txBody>
+      </p:sp>
+      <p:sp>
+        <p:nvSpPr>
+          <p:cNvPr id="4" name="灯片编号占位符 3"/>
+          <p:cNvSpPr>
+            <a:spLocks noGrp="1"/>
+          </p:cNvSpPr>
+          <p:nvPr>
+            <p:ph type="sldNum" sz="quarter" idx="5"/>
+          </p:nvPr>
+        </p:nvSpPr>
+        <p:spPr/>
+        <p:txBody>
+          <a:bodyPr/>
+          <a:lstStyle/>
+          <a:p>
+            <a:fld id="{613CC393-9814-4152-B042-3E5C9AFC6D0B}" type="slidenum">
+              <a:rPr lang="zh-CN" altLang="en-US" smtClean="0"/>
+              <a:t>8</a:t>
+            </a:fld>
+            <a:endParaRPr lang="zh-CN" altLang="en-US"/>
+          </a:p>
+        </p:txBody>
+      </p:sp>
+    </p:spTree>
+    <p:extLst>
+      <p:ext uri="{BB962C8B-B14F-4D97-AF65-F5344CB8AC3E}">
+        <p14:creationId xmlns:p14="http://schemas.microsoft.com/office/powerpoint/2010/main" val="180929727"/>
+      </p:ext>
+    </p:extLst>
+  </p:cSld>
+  <p:clrMapOvr>
+    <a:masterClrMapping/>
+  </p:clrMapOvr>
+</p:notes>
+</file>
+
+<file path=ppt/notesSlides/notesSlide9.xml><?xml version="1.0" encoding="utf-8"?>
+<p:notes xmlns:a="http://schemas.openxmlformats.org/drawingml/2006/main" xmlns:r="http://schemas.openxmlformats.org/officeDocument/2006/relationships" xmlns:p="http://schemas.openxmlformats.org/presentationml/2006/main">
+  <p:cSld>
+    <p:spTree>
+      <p:nvGrpSpPr>
+        <p:cNvPr id="1" name=""/>
+        <p:cNvGrpSpPr/>
+        <p:nvPr/>
+      </p:nvGrpSpPr>
+      <p:grpSpPr>
+        <a:xfrm>
+          <a:off x="0" y="0"/>
+          <a:ext cx="0" cy="0"/>
+          <a:chOff x="0" y="0"/>
+          <a:chExt cx="0" cy="0"/>
+        </a:xfrm>
+      </p:grpSpPr>
+      <p:sp>
+        <p:nvSpPr>
+          <p:cNvPr id="2" name="幻灯片图像占位符 1"/>
+          <p:cNvSpPr>
+            <a:spLocks noGrp="1" noRot="1" noChangeAspect="1"/>
+          </p:cNvSpPr>
+          <p:nvPr>
+            <p:ph type="sldImg"/>
+          </p:nvPr>
+        </p:nvSpPr>
+        <p:spPr/>
+      </p:sp>
+      <p:sp>
+        <p:nvSpPr>
+          <p:cNvPr id="3" name="备注占位符 2"/>
+          <p:cNvSpPr>
+            <a:spLocks noGrp="1"/>
+          </p:cNvSpPr>
+          <p:nvPr>
+            <p:ph type="body" idx="1"/>
+          </p:nvPr>
+        </p:nvSpPr>
+        <p:spPr/>
+        <p:txBody>
+          <a:bodyPr/>
+          <a:lstStyle/>
+          <a:p>
+            <a:r>
+              <a:rPr lang="en-US" altLang="zh-CN" dirty="0"/>
+              <a:t>0206 </a:t>
+            </a:r>
+            <a:r>
+              <a:rPr lang="zh-CN" altLang="en-US" dirty="0"/>
+              <a:t>反转链表</a:t>
+            </a:r>
+          </a:p>
+        </p:txBody>
+      </p:sp>
+      <p:sp>
+        <p:nvSpPr>
+          <p:cNvPr id="4" name="灯片编号占位符 3"/>
+          <p:cNvSpPr>
+            <a:spLocks noGrp="1"/>
+          </p:cNvSpPr>
+          <p:nvPr>
+            <p:ph type="sldNum" sz="quarter" idx="5"/>
+          </p:nvPr>
+        </p:nvSpPr>
+        <p:spPr/>
+        <p:txBody>
+          <a:bodyPr/>
+          <a:lstStyle/>
+          <a:p>
+            <a:fld id="{613CC393-9814-4152-B042-3E5C9AFC6D0B}" type="slidenum">
+              <a:rPr lang="zh-CN" altLang="en-US" smtClean="0"/>
+              <a:t>9</a:t>
+            </a:fld>
+            <a:endParaRPr lang="zh-CN" altLang="en-US"/>
+          </a:p>
+        </p:txBody>
+      </p:sp>
+    </p:spTree>
+    <p:extLst>
+      <p:ext uri="{BB962C8B-B14F-4D97-AF65-F5344CB8AC3E}">
+        <p14:creationId xmlns:p14="http://schemas.microsoft.com/office/powerpoint/2010/main" val="2610861837"/>
+      </p:ext>
+    </p:extLst>
+  </p:cSld>
+  <p:clrMapOvr>
+    <a:masterClrMapping/>
+  </p:clrMapOvr>
+</p:notes>
+</file>
+
 <file path=ppt/slideLayouts/slideLayout1.xml><?xml version="1.0" encoding="utf-8"?>
 <p:sldLayout xmlns:a="http://schemas.openxmlformats.org/drawingml/2006/main" xmlns:r="http://schemas.openxmlformats.org/officeDocument/2006/relationships" xmlns:p="http://schemas.openxmlformats.org/presentationml/2006/main" type="title" preserve="1">
   <p:cSld name="标题幻灯片">
@@ -1289,7 +1473,7 @@
           <a:p>
             <a:fld id="{BC9E8338-0904-49E6-9B4B-343D8E3BC7C9}" type="datetimeFigureOut">
               <a:rPr lang="zh-CN" altLang="en-US" smtClean="0"/>
-              <a:t>2021/2/24</a:t>
+              <a:t>2021/2/27</a:t>
             </a:fld>
             <a:endParaRPr lang="zh-CN" altLang="en-US"/>
           </a:p>
@@ -1487,7 +1671,7 @@
           <a:p>
             <a:fld id="{BC9E8338-0904-49E6-9B4B-343D8E3BC7C9}" type="datetimeFigureOut">
               <a:rPr lang="zh-CN" altLang="en-US" smtClean="0"/>
-              <a:t>2021/2/24</a:t>
+              <a:t>2021/2/27</a:t>
             </a:fld>
             <a:endParaRPr lang="zh-CN" altLang="en-US"/>
           </a:p>
@@ -1695,7 +1879,7 @@
           <a:p>
             <a:fld id="{BC9E8338-0904-49E6-9B4B-343D8E3BC7C9}" type="datetimeFigureOut">
               <a:rPr lang="zh-CN" altLang="en-US" smtClean="0"/>
-              <a:t>2021/2/24</a:t>
+              <a:t>2021/2/27</a:t>
             </a:fld>
             <a:endParaRPr lang="zh-CN" altLang="en-US"/>
           </a:p>
@@ -1893,7 +2077,7 @@
           <a:p>
             <a:fld id="{BC9E8338-0904-49E6-9B4B-343D8E3BC7C9}" type="datetimeFigureOut">
               <a:rPr lang="zh-CN" altLang="en-US" smtClean="0"/>
-              <a:t>2021/2/24</a:t>
+              <a:t>2021/2/27</a:t>
             </a:fld>
             <a:endParaRPr lang="zh-CN" altLang="en-US"/>
           </a:p>
@@ -2168,7 +2352,7 @@
           <a:p>
             <a:fld id="{BC9E8338-0904-49E6-9B4B-343D8E3BC7C9}" type="datetimeFigureOut">
               <a:rPr lang="zh-CN" altLang="en-US" smtClean="0"/>
-              <a:t>2021/2/24</a:t>
+              <a:t>2021/2/27</a:t>
             </a:fld>
             <a:endParaRPr lang="zh-CN" altLang="en-US"/>
           </a:p>
@@ -2433,7 +2617,7 @@
           <a:p>
             <a:fld id="{BC9E8338-0904-49E6-9B4B-343D8E3BC7C9}" type="datetimeFigureOut">
               <a:rPr lang="zh-CN" altLang="en-US" smtClean="0"/>
-              <a:t>2021/2/24</a:t>
+              <a:t>2021/2/27</a:t>
             </a:fld>
             <a:endParaRPr lang="zh-CN" altLang="en-US"/>
           </a:p>
@@ -2845,7 +3029,7 @@
           <a:p>
             <a:fld id="{BC9E8338-0904-49E6-9B4B-343D8E3BC7C9}" type="datetimeFigureOut">
               <a:rPr lang="zh-CN" altLang="en-US" smtClean="0"/>
-              <a:t>2021/2/24</a:t>
+              <a:t>2021/2/27</a:t>
             </a:fld>
             <a:endParaRPr lang="zh-CN" altLang="en-US"/>
           </a:p>
@@ -2986,7 +3170,7 @@
           <a:p>
             <a:fld id="{BC9E8338-0904-49E6-9B4B-343D8E3BC7C9}" type="datetimeFigureOut">
               <a:rPr lang="zh-CN" altLang="en-US" smtClean="0"/>
-              <a:t>2021/2/24</a:t>
+              <a:t>2021/2/27</a:t>
             </a:fld>
             <a:endParaRPr lang="zh-CN" altLang="en-US"/>
           </a:p>
@@ -3099,7 +3283,7 @@
           <a:p>
             <a:fld id="{BC9E8338-0904-49E6-9B4B-343D8E3BC7C9}" type="datetimeFigureOut">
               <a:rPr lang="zh-CN" altLang="en-US" smtClean="0"/>
-              <a:t>2021/2/24</a:t>
+              <a:t>2021/2/27</a:t>
             </a:fld>
             <a:endParaRPr lang="zh-CN" altLang="en-US"/>
           </a:p>
@@ -3410,7 +3594,7 @@
           <a:p>
             <a:fld id="{BC9E8338-0904-49E6-9B4B-343D8E3BC7C9}" type="datetimeFigureOut">
               <a:rPr lang="zh-CN" altLang="en-US" smtClean="0"/>
-              <a:t>2021/2/24</a:t>
+              <a:t>2021/2/27</a:t>
             </a:fld>
             <a:endParaRPr lang="zh-CN" altLang="en-US"/>
           </a:p>
@@ -3698,7 +3882,7 @@
           <a:p>
             <a:fld id="{BC9E8338-0904-49E6-9B4B-343D8E3BC7C9}" type="datetimeFigureOut">
               <a:rPr lang="zh-CN" altLang="en-US" smtClean="0"/>
-              <a:t>2021/2/24</a:t>
+              <a:t>2021/2/27</a:t>
             </a:fld>
             <a:endParaRPr lang="zh-CN" altLang="en-US"/>
           </a:p>
@@ -3939,7 +4123,7 @@
           <a:p>
             <a:fld id="{BC9E8338-0904-49E6-9B4B-343D8E3BC7C9}" type="datetimeFigureOut">
               <a:rPr lang="zh-CN" altLang="en-US" smtClean="0"/>
-              <a:t>2021/2/24</a:t>
+              <a:t>2021/2/27</a:t>
             </a:fld>
             <a:endParaRPr lang="zh-CN" altLang="en-US"/>
           </a:p>
@@ -32173,6 +32357,3635 @@
 </p:sld>
 </file>
 
+<file path=ppt/slides/slide8.xml><?xml version="1.0" encoding="utf-8"?>
+<p:sld xmlns:a="http://schemas.openxmlformats.org/drawingml/2006/main" xmlns:r="http://schemas.openxmlformats.org/officeDocument/2006/relationships" xmlns:p="http://schemas.openxmlformats.org/presentationml/2006/main">
+  <p:cSld>
+    <p:spTree>
+      <p:nvGrpSpPr>
+        <p:cNvPr id="1" name=""/>
+        <p:cNvGrpSpPr/>
+        <p:nvPr/>
+      </p:nvGrpSpPr>
+      <p:grpSpPr>
+        <a:xfrm>
+          <a:off x="0" y="0"/>
+          <a:ext cx="0" cy="0"/>
+          <a:chOff x="0" y="0"/>
+          <a:chExt cx="0" cy="0"/>
+        </a:xfrm>
+      </p:grpSpPr>
+      <p:graphicFrame>
+        <p:nvGraphicFramePr>
+          <p:cNvPr id="4" name="表格 4">
+            <a:extLst>
+              <a:ext uri="{FF2B5EF4-FFF2-40B4-BE49-F238E27FC236}">
+                <a16:creationId xmlns:a16="http://schemas.microsoft.com/office/drawing/2014/main" id="{31FC3A03-B4AB-4925-81F4-B77AB4466EE8}"/>
+              </a:ext>
+            </a:extLst>
+          </p:cNvPr>
+          <p:cNvGraphicFramePr>
+            <a:graphicFrameLocks noGrp="1"/>
+          </p:cNvGraphicFramePr>
+          <p:nvPr>
+            <p:extLst>
+              <p:ext uri="{D42A27DB-BD31-4B8C-83A1-F6EECF244321}">
+                <p14:modId xmlns:p14="http://schemas.microsoft.com/office/powerpoint/2010/main" val="30941085"/>
+              </p:ext>
+            </p:extLst>
+          </p:nvPr>
+        </p:nvGraphicFramePr>
+        <p:xfrm>
+          <a:off x="751438" y="1533346"/>
+          <a:ext cx="7116020" cy="2521616"/>
+        </p:xfrm>
+        <a:graphic>
+          <a:graphicData uri="http://schemas.openxmlformats.org/drawingml/2006/table">
+            <a:tbl>
+              <a:tblPr firstRow="1" bandRow="1">
+                <a:tableStyleId>{5940675A-B579-460E-94D1-54222C63F5DA}</a:tableStyleId>
+              </a:tblPr>
+              <a:tblGrid>
+                <a:gridCol w="711602">
+                  <a:extLst>
+                    <a:ext uri="{9D8B030D-6E8A-4147-A177-3AD203B41FA5}">
+                      <a16:colId xmlns:a16="http://schemas.microsoft.com/office/drawing/2014/main" val="3306016465"/>
+                    </a:ext>
+                  </a:extLst>
+                </a:gridCol>
+                <a:gridCol w="711602">
+                  <a:extLst>
+                    <a:ext uri="{9D8B030D-6E8A-4147-A177-3AD203B41FA5}">
+                      <a16:colId xmlns:a16="http://schemas.microsoft.com/office/drawing/2014/main" val="1013858275"/>
+                    </a:ext>
+                  </a:extLst>
+                </a:gridCol>
+                <a:gridCol w="711602">
+                  <a:extLst>
+                    <a:ext uri="{9D8B030D-6E8A-4147-A177-3AD203B41FA5}">
+                      <a16:colId xmlns:a16="http://schemas.microsoft.com/office/drawing/2014/main" val="3883582366"/>
+                    </a:ext>
+                  </a:extLst>
+                </a:gridCol>
+                <a:gridCol w="711602">
+                  <a:extLst>
+                    <a:ext uri="{9D8B030D-6E8A-4147-A177-3AD203B41FA5}">
+                      <a16:colId xmlns:a16="http://schemas.microsoft.com/office/drawing/2014/main" val="1095616677"/>
+                    </a:ext>
+                  </a:extLst>
+                </a:gridCol>
+                <a:gridCol w="711602">
+                  <a:extLst>
+                    <a:ext uri="{9D8B030D-6E8A-4147-A177-3AD203B41FA5}">
+                      <a16:colId xmlns:a16="http://schemas.microsoft.com/office/drawing/2014/main" val="3331465893"/>
+                    </a:ext>
+                  </a:extLst>
+                </a:gridCol>
+                <a:gridCol w="711602">
+                  <a:extLst>
+                    <a:ext uri="{9D8B030D-6E8A-4147-A177-3AD203B41FA5}">
+                      <a16:colId xmlns:a16="http://schemas.microsoft.com/office/drawing/2014/main" val="2729860172"/>
+                    </a:ext>
+                  </a:extLst>
+                </a:gridCol>
+                <a:gridCol w="711602">
+                  <a:extLst>
+                    <a:ext uri="{9D8B030D-6E8A-4147-A177-3AD203B41FA5}">
+                      <a16:colId xmlns:a16="http://schemas.microsoft.com/office/drawing/2014/main" val="607443616"/>
+                    </a:ext>
+                  </a:extLst>
+                </a:gridCol>
+                <a:gridCol w="711602">
+                  <a:extLst>
+                    <a:ext uri="{9D8B030D-6E8A-4147-A177-3AD203B41FA5}">
+                      <a16:colId xmlns:a16="http://schemas.microsoft.com/office/drawing/2014/main" val="797381111"/>
+                    </a:ext>
+                  </a:extLst>
+                </a:gridCol>
+                <a:gridCol w="711602">
+                  <a:extLst>
+                    <a:ext uri="{9D8B030D-6E8A-4147-A177-3AD203B41FA5}">
+                      <a16:colId xmlns:a16="http://schemas.microsoft.com/office/drawing/2014/main" val="4126643853"/>
+                    </a:ext>
+                  </a:extLst>
+                </a:gridCol>
+                <a:gridCol w="711602">
+                  <a:extLst>
+                    <a:ext uri="{9D8B030D-6E8A-4147-A177-3AD203B41FA5}">
+                      <a16:colId xmlns:a16="http://schemas.microsoft.com/office/drawing/2014/main" val="2957901611"/>
+                    </a:ext>
+                  </a:extLst>
+                </a:gridCol>
+              </a:tblGrid>
+              <a:tr h="423278">
+                <a:tc>
+                  <a:txBody>
+                    <a:bodyPr/>
+                    <a:lstStyle/>
+                    <a:p>
+                      <a:pPr algn="ctr"/>
+                      <a:endParaRPr lang="zh-CN" altLang="en-US" dirty="0"/>
+                    </a:p>
+                  </a:txBody>
+                  <a:tcPr anchor="ctr"/>
+                </a:tc>
+                <a:tc>
+                  <a:txBody>
+                    <a:bodyPr/>
+                    <a:lstStyle/>
+                    <a:p>
+                      <a:pPr algn="ctr"/>
+                      <a:r>
+                        <a:rPr lang="en-US" altLang="zh-CN" dirty="0"/>
+                        <a:t>0</a:t>
+                      </a:r>
+                      <a:endParaRPr lang="zh-CN" altLang="en-US" dirty="0"/>
+                    </a:p>
+                  </a:txBody>
+                  <a:tcPr anchor="ctr"/>
+                </a:tc>
+                <a:tc>
+                  <a:txBody>
+                    <a:bodyPr/>
+                    <a:lstStyle/>
+                    <a:p>
+                      <a:pPr algn="ctr"/>
+                      <a:r>
+                        <a:rPr lang="en-US" altLang="zh-CN" dirty="0"/>
+                        <a:t>1</a:t>
+                      </a:r>
+                      <a:endParaRPr lang="zh-CN" altLang="en-US" dirty="0"/>
+                    </a:p>
+                  </a:txBody>
+                  <a:tcPr anchor="ctr"/>
+                </a:tc>
+                <a:tc>
+                  <a:txBody>
+                    <a:bodyPr/>
+                    <a:lstStyle/>
+                    <a:p>
+                      <a:pPr algn="ctr"/>
+                      <a:r>
+                        <a:rPr lang="en-US" altLang="zh-CN" dirty="0"/>
+                        <a:t>2</a:t>
+                      </a:r>
+                      <a:endParaRPr lang="zh-CN" altLang="en-US" dirty="0"/>
+                    </a:p>
+                  </a:txBody>
+                  <a:tcPr anchor="ctr"/>
+                </a:tc>
+                <a:tc>
+                  <a:txBody>
+                    <a:bodyPr/>
+                    <a:lstStyle/>
+                    <a:p>
+                      <a:pPr algn="ctr"/>
+                      <a:r>
+                        <a:rPr lang="en-US" altLang="zh-CN" dirty="0"/>
+                        <a:t>3</a:t>
+                      </a:r>
+                      <a:endParaRPr lang="zh-CN" altLang="en-US" dirty="0"/>
+                    </a:p>
+                  </a:txBody>
+                  <a:tcPr anchor="ctr"/>
+                </a:tc>
+                <a:tc>
+                  <a:txBody>
+                    <a:bodyPr/>
+                    <a:lstStyle/>
+                    <a:p>
+                      <a:pPr algn="ctr"/>
+                      <a:r>
+                        <a:rPr lang="en-US" altLang="zh-CN" dirty="0"/>
+                        <a:t>4</a:t>
+                      </a:r>
+                      <a:endParaRPr lang="zh-CN" altLang="en-US" dirty="0"/>
+                    </a:p>
+                  </a:txBody>
+                  <a:tcPr anchor="ctr"/>
+                </a:tc>
+                <a:tc>
+                  <a:txBody>
+                    <a:bodyPr/>
+                    <a:lstStyle/>
+                    <a:p>
+                      <a:pPr algn="ctr"/>
+                      <a:r>
+                        <a:rPr lang="en-US" altLang="zh-CN" dirty="0"/>
+                        <a:t>5</a:t>
+                      </a:r>
+                      <a:endParaRPr lang="zh-CN" altLang="en-US" dirty="0"/>
+                    </a:p>
+                  </a:txBody>
+                  <a:tcPr anchor="ctr"/>
+                </a:tc>
+                <a:tc>
+                  <a:txBody>
+                    <a:bodyPr/>
+                    <a:lstStyle/>
+                    <a:p>
+                      <a:pPr algn="ctr"/>
+                      <a:endParaRPr lang="zh-CN" altLang="en-US" dirty="0"/>
+                    </a:p>
+                  </a:txBody>
+                  <a:tcPr anchor="ctr"/>
+                </a:tc>
+                <a:tc>
+                  <a:txBody>
+                    <a:bodyPr/>
+                    <a:lstStyle/>
+                    <a:p>
+                      <a:pPr algn="ctr"/>
+                      <a:endParaRPr lang="zh-CN" altLang="en-US" dirty="0"/>
+                    </a:p>
+                  </a:txBody>
+                  <a:tcPr anchor="ctr"/>
+                </a:tc>
+                <a:tc>
+                  <a:txBody>
+                    <a:bodyPr/>
+                    <a:lstStyle/>
+                    <a:p>
+                      <a:pPr algn="ctr"/>
+                      <a:endParaRPr lang="zh-CN" altLang="en-US" dirty="0"/>
+                    </a:p>
+                  </a:txBody>
+                  <a:tcPr anchor="ctr"/>
+                </a:tc>
+                <a:extLst>
+                  <a:ext uri="{0D108BD9-81ED-4DB2-BD59-A6C34878D82A}">
+                    <a16:rowId xmlns:a16="http://schemas.microsoft.com/office/drawing/2014/main" val="3707695066"/>
+                  </a:ext>
+                </a:extLst>
+              </a:tr>
+              <a:tr h="423278">
+                <a:tc>
+                  <a:txBody>
+                    <a:bodyPr/>
+                    <a:lstStyle/>
+                    <a:p>
+                      <a:pPr algn="ctr"/>
+                      <a:endParaRPr lang="zh-CN" altLang="en-US" dirty="0"/>
+                    </a:p>
+                  </a:txBody>
+                  <a:tcPr anchor="ctr"/>
+                </a:tc>
+                <a:tc>
+                  <a:txBody>
+                    <a:bodyPr/>
+                    <a:lstStyle/>
+                    <a:p>
+                      <a:pPr algn="ctr"/>
+                      <a:r>
+                        <a:rPr lang="en-US" altLang="zh-CN" dirty="0"/>
+                        <a:t>p</a:t>
+                      </a:r>
+                      <a:endParaRPr lang="zh-CN" altLang="en-US" dirty="0"/>
+                    </a:p>
+                  </a:txBody>
+                  <a:tcPr anchor="ctr"/>
+                </a:tc>
+                <a:tc>
+                  <a:txBody>
+                    <a:bodyPr/>
+                    <a:lstStyle/>
+                    <a:p>
+                      <a:pPr algn="ctr"/>
+                      <a:r>
+                        <a:rPr lang="en-US" altLang="zh-CN" dirty="0"/>
+                        <a:t>w</a:t>
+                      </a:r>
+                      <a:endParaRPr lang="zh-CN" altLang="en-US" dirty="0"/>
+                    </a:p>
+                  </a:txBody>
+                  <a:tcPr anchor="ctr"/>
+                </a:tc>
+                <a:tc>
+                  <a:txBody>
+                    <a:bodyPr/>
+                    <a:lstStyle/>
+                    <a:p>
+                      <a:pPr algn="ctr"/>
+                      <a:r>
+                        <a:rPr lang="en-US" altLang="zh-CN" dirty="0"/>
+                        <a:t>w</a:t>
+                      </a:r>
+                      <a:endParaRPr lang="zh-CN" altLang="en-US" dirty="0"/>
+                    </a:p>
+                  </a:txBody>
+                  <a:tcPr anchor="ctr"/>
+                </a:tc>
+                <a:tc>
+                  <a:txBody>
+                    <a:bodyPr/>
+                    <a:lstStyle/>
+                    <a:p>
+                      <a:pPr algn="ctr"/>
+                      <a:r>
+                        <a:rPr lang="en-US" altLang="zh-CN" dirty="0"/>
+                        <a:t>k</a:t>
+                      </a:r>
+                      <a:endParaRPr lang="zh-CN" altLang="en-US" dirty="0"/>
+                    </a:p>
+                  </a:txBody>
+                  <a:tcPr anchor="ctr"/>
+                </a:tc>
+                <a:tc>
+                  <a:txBody>
+                    <a:bodyPr/>
+                    <a:lstStyle/>
+                    <a:p>
+                      <a:pPr algn="ctr"/>
+                      <a:r>
+                        <a:rPr lang="en-US" altLang="zh-CN" dirty="0"/>
+                        <a:t>e</a:t>
+                      </a:r>
+                      <a:endParaRPr lang="zh-CN" altLang="en-US" dirty="0"/>
+                    </a:p>
+                  </a:txBody>
+                  <a:tcPr anchor="ctr"/>
+                </a:tc>
+                <a:tc>
+                  <a:txBody>
+                    <a:bodyPr/>
+                    <a:lstStyle/>
+                    <a:p>
+                      <a:pPr algn="ctr"/>
+                      <a:r>
+                        <a:rPr lang="en-US" altLang="zh-CN" dirty="0"/>
+                        <a:t>w</a:t>
+                      </a:r>
+                      <a:endParaRPr lang="zh-CN" altLang="en-US" dirty="0"/>
+                    </a:p>
+                  </a:txBody>
+                  <a:tcPr anchor="ctr"/>
+                </a:tc>
+                <a:tc>
+                  <a:txBody>
+                    <a:bodyPr/>
+                    <a:lstStyle/>
+                    <a:p>
+                      <a:pPr algn="ctr"/>
+                      <a:endParaRPr lang="zh-CN" altLang="en-US" dirty="0"/>
+                    </a:p>
+                  </a:txBody>
+                  <a:tcPr anchor="ctr"/>
+                </a:tc>
+                <a:tc>
+                  <a:txBody>
+                    <a:bodyPr/>
+                    <a:lstStyle/>
+                    <a:p>
+                      <a:pPr algn="ctr"/>
+                      <a:r>
+                        <a:rPr lang="zh-CN" altLang="en-US" dirty="0"/>
+                        <a:t>长度</a:t>
+                      </a:r>
+                    </a:p>
+                  </a:txBody>
+                  <a:tcPr anchor="ctr"/>
+                </a:tc>
+                <a:tc>
+                  <a:txBody>
+                    <a:bodyPr/>
+                    <a:lstStyle/>
+                    <a:p>
+                      <a:pPr algn="ctr"/>
+                      <a:r>
+                        <a:rPr lang="en-US" altLang="zh-CN" dirty="0"/>
+                        <a:t>max</a:t>
+                      </a:r>
+                      <a:endParaRPr lang="zh-CN" altLang="en-US" dirty="0"/>
+                    </a:p>
+                  </a:txBody>
+                  <a:tcPr anchor="ctr"/>
+                </a:tc>
+                <a:extLst>
+                  <a:ext uri="{0D108BD9-81ED-4DB2-BD59-A6C34878D82A}">
+                    <a16:rowId xmlns:a16="http://schemas.microsoft.com/office/drawing/2014/main" val="614881800"/>
+                  </a:ext>
+                </a:extLst>
+              </a:tr>
+              <a:tr h="414252">
+                <a:tc>
+                  <a:txBody>
+                    <a:bodyPr/>
+                    <a:lstStyle/>
+                    <a:p>
+                      <a:pPr algn="ctr"/>
+                      <a:endParaRPr lang="zh-CN" altLang="en-US" dirty="0"/>
+                    </a:p>
+                  </a:txBody>
+                  <a:tcPr anchor="ctr"/>
+                </a:tc>
+                <a:tc>
+                  <a:txBody>
+                    <a:bodyPr/>
+                    <a:lstStyle/>
+                    <a:p>
+                      <a:pPr algn="ctr"/>
+                      <a:r>
+                        <a:rPr lang="zh-CN" altLang="en-US" dirty="0">
+                          <a:solidFill>
+                            <a:srgbClr val="00B0F0"/>
+                          </a:solidFill>
+                        </a:rPr>
+                        <a:t>↑</a:t>
+                      </a:r>
+                      <a:r>
+                        <a:rPr lang="zh-CN" altLang="en-US" dirty="0">
+                          <a:solidFill>
+                            <a:srgbClr val="FF0000"/>
+                          </a:solidFill>
+                        </a:rPr>
+                        <a:t>↑</a:t>
+                      </a:r>
+                    </a:p>
+                  </a:txBody>
+                  <a:tcPr anchor="ctr"/>
+                </a:tc>
+                <a:tc>
+                  <a:txBody>
+                    <a:bodyPr/>
+                    <a:lstStyle/>
+                    <a:p>
+                      <a:pPr algn="ctr"/>
+                      <a:endParaRPr lang="zh-CN" altLang="en-US" dirty="0">
+                        <a:solidFill>
+                          <a:srgbClr val="FF0000"/>
+                        </a:solidFill>
+                      </a:endParaRPr>
+                    </a:p>
+                  </a:txBody>
+                  <a:tcPr anchor="ctr"/>
+                </a:tc>
+                <a:tc>
+                  <a:txBody>
+                    <a:bodyPr/>
+                    <a:lstStyle/>
+                    <a:p>
+                      <a:pPr algn="ctr"/>
+                      <a:endParaRPr lang="zh-CN" altLang="en-US" dirty="0">
+                        <a:solidFill>
+                          <a:srgbClr val="FF0000"/>
+                        </a:solidFill>
+                      </a:endParaRPr>
+                    </a:p>
+                  </a:txBody>
+                  <a:tcPr anchor="ctr"/>
+                </a:tc>
+                <a:tc>
+                  <a:txBody>
+                    <a:bodyPr/>
+                    <a:lstStyle/>
+                    <a:p>
+                      <a:pPr algn="ctr"/>
+                      <a:endParaRPr lang="zh-CN" altLang="en-US"/>
+                    </a:p>
+                  </a:txBody>
+                  <a:tcPr anchor="ctr"/>
+                </a:tc>
+                <a:tc>
+                  <a:txBody>
+                    <a:bodyPr/>
+                    <a:lstStyle/>
+                    <a:p>
+                      <a:pPr algn="ctr"/>
+                      <a:endParaRPr lang="zh-CN" altLang="en-US"/>
+                    </a:p>
+                  </a:txBody>
+                  <a:tcPr anchor="ctr"/>
+                </a:tc>
+                <a:tc>
+                  <a:txBody>
+                    <a:bodyPr/>
+                    <a:lstStyle/>
+                    <a:p>
+                      <a:pPr algn="ctr"/>
+                      <a:endParaRPr lang="zh-CN" altLang="en-US"/>
+                    </a:p>
+                  </a:txBody>
+                  <a:tcPr anchor="ctr"/>
+                </a:tc>
+                <a:tc>
+                  <a:txBody>
+                    <a:bodyPr/>
+                    <a:lstStyle/>
+                    <a:p>
+                      <a:pPr algn="ctr"/>
+                      <a:endParaRPr lang="zh-CN" altLang="en-US" dirty="0"/>
+                    </a:p>
+                  </a:txBody>
+                  <a:tcPr anchor="ctr"/>
+                </a:tc>
+                <a:tc>
+                  <a:txBody>
+                    <a:bodyPr/>
+                    <a:lstStyle/>
+                    <a:p>
+                      <a:pPr algn="ctr"/>
+                      <a:endParaRPr lang="zh-CN" altLang="en-US" dirty="0"/>
+                    </a:p>
+                  </a:txBody>
+                  <a:tcPr anchor="ctr"/>
+                </a:tc>
+                <a:tc>
+                  <a:txBody>
+                    <a:bodyPr/>
+                    <a:lstStyle/>
+                    <a:p>
+                      <a:pPr algn="ctr"/>
+                      <a:endParaRPr lang="zh-CN" altLang="en-US" dirty="0"/>
+                    </a:p>
+                  </a:txBody>
+                  <a:tcPr anchor="ctr"/>
+                </a:tc>
+                <a:extLst>
+                  <a:ext uri="{0D108BD9-81ED-4DB2-BD59-A6C34878D82A}">
+                    <a16:rowId xmlns:a16="http://schemas.microsoft.com/office/drawing/2014/main" val="2039135953"/>
+                  </a:ext>
+                </a:extLst>
+              </a:tr>
+              <a:tr h="414252">
+                <a:tc>
+                  <a:txBody>
+                    <a:bodyPr/>
+                    <a:lstStyle/>
+                    <a:p>
+                      <a:pPr algn="ctr"/>
+                      <a:r>
+                        <a:rPr lang="en-US" altLang="zh-CN" dirty="0"/>
+                        <a:t>1</a:t>
+                      </a:r>
+                      <a:endParaRPr lang="zh-CN" altLang="en-US" dirty="0"/>
+                    </a:p>
+                  </a:txBody>
+                  <a:tcPr anchor="ctr"/>
+                </a:tc>
+                <a:tc>
+                  <a:txBody>
+                    <a:bodyPr/>
+                    <a:lstStyle/>
+                    <a:p>
+                      <a:pPr algn="ctr"/>
+                      <a:r>
+                        <a:rPr lang="zh-CN" altLang="en-US" dirty="0">
+                          <a:solidFill>
+                            <a:srgbClr val="00B0F0"/>
+                          </a:solidFill>
+                        </a:rPr>
+                        <a:t>↑</a:t>
+                      </a:r>
+                    </a:p>
+                  </a:txBody>
+                  <a:tcPr anchor="ctr"/>
+                </a:tc>
+                <a:tc>
+                  <a:txBody>
+                    <a:bodyPr/>
+                    <a:lstStyle/>
+                    <a:p>
+                      <a:pPr algn="ctr"/>
+                      <a:endParaRPr lang="zh-CN" altLang="en-US" dirty="0"/>
+                    </a:p>
+                  </a:txBody>
+                  <a:tcPr anchor="ctr"/>
+                </a:tc>
+                <a:tc>
+                  <a:txBody>
+                    <a:bodyPr/>
+                    <a:lstStyle/>
+                    <a:p>
+                      <a:pPr algn="ctr"/>
+                      <a:r>
+                        <a:rPr lang="zh-CN" altLang="en-US" dirty="0">
+                          <a:solidFill>
+                            <a:srgbClr val="FF0000"/>
+                          </a:solidFill>
+                        </a:rPr>
+                        <a:t>↑</a:t>
+                      </a:r>
+                    </a:p>
+                  </a:txBody>
+                  <a:tcPr anchor="ctr"/>
+                </a:tc>
+                <a:tc>
+                  <a:txBody>
+                    <a:bodyPr/>
+                    <a:lstStyle/>
+                    <a:p>
+                      <a:pPr algn="ctr"/>
+                      <a:endParaRPr lang="zh-CN" altLang="en-US"/>
+                    </a:p>
+                  </a:txBody>
+                  <a:tcPr anchor="ctr"/>
+                </a:tc>
+                <a:tc>
+                  <a:txBody>
+                    <a:bodyPr/>
+                    <a:lstStyle/>
+                    <a:p>
+                      <a:pPr algn="ctr"/>
+                      <a:endParaRPr lang="zh-CN" altLang="en-US"/>
+                    </a:p>
+                  </a:txBody>
+                  <a:tcPr anchor="ctr"/>
+                </a:tc>
+                <a:tc>
+                  <a:txBody>
+                    <a:bodyPr/>
+                    <a:lstStyle/>
+                    <a:p>
+                      <a:pPr algn="ctr"/>
+                      <a:endParaRPr lang="zh-CN" altLang="en-US" dirty="0"/>
+                    </a:p>
+                  </a:txBody>
+                  <a:tcPr anchor="ctr"/>
+                </a:tc>
+                <a:tc>
+                  <a:txBody>
+                    <a:bodyPr/>
+                    <a:lstStyle/>
+                    <a:p>
+                      <a:pPr algn="ctr"/>
+                      <a:endParaRPr lang="zh-CN" altLang="en-US" dirty="0"/>
+                    </a:p>
+                  </a:txBody>
+                  <a:tcPr anchor="ctr"/>
+                </a:tc>
+                <a:tc>
+                  <a:txBody>
+                    <a:bodyPr/>
+                    <a:lstStyle/>
+                    <a:p>
+                      <a:pPr algn="ctr"/>
+                      <a:r>
+                        <a:rPr lang="en-US" altLang="zh-CN" dirty="0"/>
+                        <a:t>2</a:t>
+                      </a:r>
+                      <a:endParaRPr lang="zh-CN" altLang="en-US" dirty="0"/>
+                    </a:p>
+                  </a:txBody>
+                  <a:tcPr anchor="ctr"/>
+                </a:tc>
+                <a:tc>
+                  <a:txBody>
+                    <a:bodyPr/>
+                    <a:lstStyle/>
+                    <a:p>
+                      <a:pPr algn="ctr"/>
+                      <a:r>
+                        <a:rPr lang="en-US" altLang="zh-CN" dirty="0"/>
+                        <a:t>2</a:t>
+                      </a:r>
+                      <a:endParaRPr lang="zh-CN" altLang="en-US" dirty="0"/>
+                    </a:p>
+                  </a:txBody>
+                  <a:tcPr anchor="ctr"/>
+                </a:tc>
+                <a:extLst>
+                  <a:ext uri="{0D108BD9-81ED-4DB2-BD59-A6C34878D82A}">
+                    <a16:rowId xmlns:a16="http://schemas.microsoft.com/office/drawing/2014/main" val="249920053"/>
+                  </a:ext>
+                </a:extLst>
+              </a:tr>
+              <a:tr h="423278">
+                <a:tc>
+                  <a:txBody>
+                    <a:bodyPr/>
+                    <a:lstStyle/>
+                    <a:p>
+                      <a:pPr algn="ctr"/>
+                      <a:r>
+                        <a:rPr lang="en-US" altLang="zh-CN" dirty="0"/>
+                        <a:t>2</a:t>
+                      </a:r>
+                      <a:endParaRPr lang="zh-CN" altLang="en-US" dirty="0"/>
+                    </a:p>
+                  </a:txBody>
+                  <a:tcPr anchor="ctr"/>
+                </a:tc>
+                <a:tc>
+                  <a:txBody>
+                    <a:bodyPr/>
+                    <a:lstStyle/>
+                    <a:p>
+                      <a:pPr algn="ctr"/>
+                      <a:endParaRPr lang="zh-CN" altLang="en-US" dirty="0"/>
+                    </a:p>
+                  </a:txBody>
+                  <a:tcPr anchor="ctr"/>
+                </a:tc>
+                <a:tc>
+                  <a:txBody>
+                    <a:bodyPr/>
+                    <a:lstStyle/>
+                    <a:p>
+                      <a:pPr algn="ctr"/>
+                      <a:r>
+                        <a:rPr lang="zh-CN" altLang="en-US" dirty="0">
+                          <a:solidFill>
+                            <a:srgbClr val="00B0F0"/>
+                          </a:solidFill>
+                        </a:rPr>
+                        <a:t>↑</a:t>
+                      </a:r>
+                    </a:p>
+                  </a:txBody>
+                  <a:tcPr anchor="ctr"/>
+                </a:tc>
+                <a:tc>
+                  <a:txBody>
+                    <a:bodyPr/>
+                    <a:lstStyle/>
+                    <a:p>
+                      <a:pPr algn="ctr"/>
+                      <a:r>
+                        <a:rPr lang="zh-CN" altLang="en-US" dirty="0">
+                          <a:solidFill>
+                            <a:srgbClr val="FF0000"/>
+                          </a:solidFill>
+                        </a:rPr>
+                        <a:t>↑</a:t>
+                      </a:r>
+                    </a:p>
+                  </a:txBody>
+                  <a:tcPr anchor="ctr"/>
+                </a:tc>
+                <a:tc>
+                  <a:txBody>
+                    <a:bodyPr/>
+                    <a:lstStyle/>
+                    <a:p>
+                      <a:pPr algn="ctr"/>
+                      <a:endParaRPr lang="zh-CN" altLang="en-US" dirty="0"/>
+                    </a:p>
+                  </a:txBody>
+                  <a:tcPr anchor="ctr"/>
+                </a:tc>
+                <a:tc>
+                  <a:txBody>
+                    <a:bodyPr/>
+                    <a:lstStyle/>
+                    <a:p>
+                      <a:pPr algn="ctr"/>
+                      <a:endParaRPr lang="zh-CN" altLang="en-US" dirty="0"/>
+                    </a:p>
+                  </a:txBody>
+                  <a:tcPr anchor="ctr"/>
+                </a:tc>
+                <a:tc>
+                  <a:txBody>
+                    <a:bodyPr/>
+                    <a:lstStyle/>
+                    <a:p>
+                      <a:pPr algn="ctr"/>
+                      <a:endParaRPr lang="zh-CN" altLang="en-US" dirty="0"/>
+                    </a:p>
+                  </a:txBody>
+                  <a:tcPr anchor="ctr"/>
+                </a:tc>
+                <a:tc>
+                  <a:txBody>
+                    <a:bodyPr/>
+                    <a:lstStyle/>
+                    <a:p>
+                      <a:pPr algn="ctr"/>
+                      <a:endParaRPr lang="zh-CN" altLang="en-US" dirty="0"/>
+                    </a:p>
+                  </a:txBody>
+                  <a:tcPr anchor="ctr"/>
+                </a:tc>
+                <a:tc>
+                  <a:txBody>
+                    <a:bodyPr/>
+                    <a:lstStyle/>
+                    <a:p>
+                      <a:pPr algn="ctr"/>
+                      <a:r>
+                        <a:rPr lang="en-US" altLang="zh-CN" dirty="0"/>
+                        <a:t>1</a:t>
+                      </a:r>
+                      <a:endParaRPr lang="zh-CN" altLang="en-US" dirty="0"/>
+                    </a:p>
+                  </a:txBody>
+                  <a:tcPr anchor="ctr"/>
+                </a:tc>
+                <a:tc>
+                  <a:txBody>
+                    <a:bodyPr/>
+                    <a:lstStyle/>
+                    <a:p>
+                      <a:pPr algn="ctr"/>
+                      <a:r>
+                        <a:rPr lang="en-US" altLang="zh-CN" dirty="0"/>
+                        <a:t>2</a:t>
+                      </a:r>
+                      <a:endParaRPr lang="zh-CN" altLang="en-US" dirty="0"/>
+                    </a:p>
+                  </a:txBody>
+                  <a:tcPr anchor="ctr"/>
+                </a:tc>
+                <a:extLst>
+                  <a:ext uri="{0D108BD9-81ED-4DB2-BD59-A6C34878D82A}">
+                    <a16:rowId xmlns:a16="http://schemas.microsoft.com/office/drawing/2014/main" val="1162794459"/>
+                  </a:ext>
+                </a:extLst>
+              </a:tr>
+              <a:tr h="423278">
+                <a:tc>
+                  <a:txBody>
+                    <a:bodyPr/>
+                    <a:lstStyle/>
+                    <a:p>
+                      <a:pPr algn="ctr"/>
+                      <a:r>
+                        <a:rPr lang="en-US" altLang="zh-CN" dirty="0"/>
+                        <a:t>3</a:t>
+                      </a:r>
+                      <a:endParaRPr lang="zh-CN" altLang="en-US" dirty="0"/>
+                    </a:p>
+                  </a:txBody>
+                  <a:tcPr anchor="ctr"/>
+                </a:tc>
+                <a:tc>
+                  <a:txBody>
+                    <a:bodyPr/>
+                    <a:lstStyle/>
+                    <a:p>
+                      <a:pPr algn="ctr"/>
+                      <a:endParaRPr lang="zh-CN" altLang="en-US" dirty="0"/>
+                    </a:p>
+                  </a:txBody>
+                  <a:tcPr anchor="ctr"/>
+                </a:tc>
+                <a:tc>
+                  <a:txBody>
+                    <a:bodyPr/>
+                    <a:lstStyle/>
+                    <a:p>
+                      <a:pPr algn="ctr"/>
+                      <a:endParaRPr lang="zh-CN" altLang="en-US" dirty="0"/>
+                    </a:p>
+                  </a:txBody>
+                  <a:tcPr anchor="ctr"/>
+                </a:tc>
+                <a:tc>
+                  <a:txBody>
+                    <a:bodyPr/>
+                    <a:lstStyle/>
+                    <a:p>
+                      <a:pPr algn="ctr"/>
+                      <a:r>
+                        <a:rPr lang="zh-CN" altLang="en-US" dirty="0">
+                          <a:solidFill>
+                            <a:srgbClr val="00B0F0"/>
+                          </a:solidFill>
+                        </a:rPr>
+                        <a:t>↑</a:t>
+                      </a:r>
+                    </a:p>
+                  </a:txBody>
+                  <a:tcPr anchor="ctr"/>
+                </a:tc>
+                <a:tc>
+                  <a:txBody>
+                    <a:bodyPr/>
+                    <a:lstStyle/>
+                    <a:p>
+                      <a:pPr algn="ctr"/>
+                      <a:endParaRPr lang="zh-CN" altLang="en-US" dirty="0"/>
+                    </a:p>
+                  </a:txBody>
+                  <a:tcPr anchor="ctr"/>
+                </a:tc>
+                <a:tc>
+                  <a:txBody>
+                    <a:bodyPr/>
+                    <a:lstStyle/>
+                    <a:p>
+                      <a:pPr algn="ctr"/>
+                      <a:endParaRPr lang="zh-CN" altLang="en-US" dirty="0"/>
+                    </a:p>
+                  </a:txBody>
+                  <a:tcPr anchor="ctr"/>
+                </a:tc>
+                <a:tc>
+                  <a:txBody>
+                    <a:bodyPr/>
+                    <a:lstStyle/>
+                    <a:p>
+                      <a:pPr algn="ctr"/>
+                      <a:r>
+                        <a:rPr lang="zh-CN" altLang="en-US" dirty="0">
+                          <a:solidFill>
+                            <a:srgbClr val="FF0000"/>
+                          </a:solidFill>
+                        </a:rPr>
+                        <a:t>↑</a:t>
+                      </a:r>
+                    </a:p>
+                  </a:txBody>
+                  <a:tcPr anchor="ctr"/>
+                </a:tc>
+                <a:tc>
+                  <a:txBody>
+                    <a:bodyPr/>
+                    <a:lstStyle/>
+                    <a:p>
+                      <a:pPr algn="ctr"/>
+                      <a:endParaRPr lang="zh-CN" altLang="en-US" dirty="0"/>
+                    </a:p>
+                  </a:txBody>
+                  <a:tcPr anchor="ctr"/>
+                </a:tc>
+                <a:tc>
+                  <a:txBody>
+                    <a:bodyPr/>
+                    <a:lstStyle/>
+                    <a:p>
+                      <a:pPr algn="ctr"/>
+                      <a:r>
+                        <a:rPr lang="en-US" altLang="zh-CN" dirty="0"/>
+                        <a:t>3</a:t>
+                      </a:r>
+                      <a:endParaRPr lang="zh-CN" altLang="en-US" dirty="0"/>
+                    </a:p>
+                  </a:txBody>
+                  <a:tcPr anchor="ctr"/>
+                </a:tc>
+                <a:tc>
+                  <a:txBody>
+                    <a:bodyPr/>
+                    <a:lstStyle/>
+                    <a:p>
+                      <a:pPr algn="ctr"/>
+                      <a:r>
+                        <a:rPr lang="en-US" altLang="zh-CN" dirty="0"/>
+                        <a:t>3</a:t>
+                      </a:r>
+                      <a:endParaRPr lang="zh-CN" altLang="en-US" dirty="0"/>
+                    </a:p>
+                  </a:txBody>
+                  <a:tcPr anchor="ctr"/>
+                </a:tc>
+                <a:extLst>
+                  <a:ext uri="{0D108BD9-81ED-4DB2-BD59-A6C34878D82A}">
+                    <a16:rowId xmlns:a16="http://schemas.microsoft.com/office/drawing/2014/main" val="3382695058"/>
+                  </a:ext>
+                </a:extLst>
+              </a:tr>
+            </a:tbl>
+          </a:graphicData>
+        </a:graphic>
+      </p:graphicFrame>
+    </p:spTree>
+    <p:extLst>
+      <p:ext uri="{BB962C8B-B14F-4D97-AF65-F5344CB8AC3E}">
+        <p14:creationId xmlns:p14="http://schemas.microsoft.com/office/powerpoint/2010/main" val="2439992540"/>
+      </p:ext>
+    </p:extLst>
+  </p:cSld>
+  <p:clrMapOvr>
+    <a:masterClrMapping/>
+  </p:clrMapOvr>
+</p:sld>
+</file>
+
+<file path=ppt/slides/slide9.xml><?xml version="1.0" encoding="utf-8"?>
+<p:sld xmlns:a="http://schemas.openxmlformats.org/drawingml/2006/main" xmlns:r="http://schemas.openxmlformats.org/officeDocument/2006/relationships" xmlns:p="http://schemas.openxmlformats.org/presentationml/2006/main">
+  <p:cSld>
+    <p:spTree>
+      <p:nvGrpSpPr>
+        <p:cNvPr id="1" name=""/>
+        <p:cNvGrpSpPr/>
+        <p:nvPr/>
+      </p:nvGrpSpPr>
+      <p:grpSpPr>
+        <a:xfrm>
+          <a:off x="0" y="0"/>
+          <a:ext cx="0" cy="0"/>
+          <a:chOff x="0" y="0"/>
+          <a:chExt cx="0" cy="0"/>
+        </a:xfrm>
+      </p:grpSpPr>
+      <p:sp>
+        <p:nvSpPr>
+          <p:cNvPr id="54" name="矩形 53">
+            <a:extLst>
+              <a:ext uri="{FF2B5EF4-FFF2-40B4-BE49-F238E27FC236}">
+                <a16:creationId xmlns:a16="http://schemas.microsoft.com/office/drawing/2014/main" id="{AAA26ACE-FD90-43F3-A8BE-FEACA56BC736}"/>
+              </a:ext>
+            </a:extLst>
+          </p:cNvPr>
+          <p:cNvSpPr/>
+          <p:nvPr/>
+        </p:nvSpPr>
+        <p:spPr>
+          <a:xfrm>
+            <a:off x="530673" y="2474727"/>
+            <a:ext cx="688063" cy="334978"/>
+          </a:xfrm>
+          <a:prstGeom prst="rect">
+            <a:avLst/>
+          </a:prstGeom>
+          <a:ln>
+            <a:prstDash val="dash"/>
+          </a:ln>
+        </p:spPr>
+        <p:style>
+          <a:lnRef idx="2">
+            <a:schemeClr val="dk1"/>
+          </a:lnRef>
+          <a:fillRef idx="1">
+            <a:schemeClr val="lt1"/>
+          </a:fillRef>
+          <a:effectRef idx="0">
+            <a:schemeClr val="dk1"/>
+          </a:effectRef>
+          <a:fontRef idx="minor">
+            <a:schemeClr val="dk1"/>
+          </a:fontRef>
+        </p:style>
+        <p:txBody>
+          <a:bodyPr rtlCol="0" anchor="ctr"/>
+          <a:lstStyle/>
+          <a:p>
+            <a:pPr algn="ctr"/>
+            <a:endParaRPr lang="zh-CN" altLang="en-US" dirty="0">
+              <a:latin typeface="Times New Roman" panose="02020603050405020304" pitchFamily="18" charset="0"/>
+              <a:cs typeface="Times New Roman" panose="02020603050405020304" pitchFamily="18" charset="0"/>
+            </a:endParaRPr>
+          </a:p>
+        </p:txBody>
+      </p:sp>
+      <p:sp>
+        <p:nvSpPr>
+          <p:cNvPr id="55" name="矩形 54">
+            <a:extLst>
+              <a:ext uri="{FF2B5EF4-FFF2-40B4-BE49-F238E27FC236}">
+                <a16:creationId xmlns:a16="http://schemas.microsoft.com/office/drawing/2014/main" id="{8F572262-3B7B-43EC-8390-FE194FF8E667}"/>
+              </a:ext>
+            </a:extLst>
+          </p:cNvPr>
+          <p:cNvSpPr/>
+          <p:nvPr/>
+        </p:nvSpPr>
+        <p:spPr>
+          <a:xfrm>
+            <a:off x="1849287" y="2483171"/>
+            <a:ext cx="688063" cy="334978"/>
+          </a:xfrm>
+          <a:prstGeom prst="rect">
+            <a:avLst/>
+          </a:prstGeom>
+        </p:spPr>
+        <p:style>
+          <a:lnRef idx="2">
+            <a:schemeClr val="dk1"/>
+          </a:lnRef>
+          <a:fillRef idx="1">
+            <a:schemeClr val="lt1"/>
+          </a:fillRef>
+          <a:effectRef idx="0">
+            <a:schemeClr val="dk1"/>
+          </a:effectRef>
+          <a:fontRef idx="minor">
+            <a:schemeClr val="dk1"/>
+          </a:fontRef>
+        </p:style>
+        <p:txBody>
+          <a:bodyPr rtlCol="0" anchor="ctr"/>
+          <a:lstStyle/>
+          <a:p>
+            <a:pPr algn="ctr"/>
+            <a:r>
+              <a:rPr lang="en-US" altLang="zh-CN" dirty="0">
+                <a:latin typeface="Times New Roman" panose="02020603050405020304" pitchFamily="18" charset="0"/>
+                <a:cs typeface="Times New Roman" panose="02020603050405020304" pitchFamily="18" charset="0"/>
+              </a:rPr>
+              <a:t>1</a:t>
+            </a:r>
+            <a:endParaRPr lang="zh-CN" altLang="en-US" dirty="0">
+              <a:latin typeface="Times New Roman" panose="02020603050405020304" pitchFamily="18" charset="0"/>
+              <a:cs typeface="Times New Roman" panose="02020603050405020304" pitchFamily="18" charset="0"/>
+            </a:endParaRPr>
+          </a:p>
+        </p:txBody>
+      </p:sp>
+      <p:cxnSp>
+        <p:nvCxnSpPr>
+          <p:cNvPr id="56" name="直接箭头连接符 55">
+            <a:extLst>
+              <a:ext uri="{FF2B5EF4-FFF2-40B4-BE49-F238E27FC236}">
+                <a16:creationId xmlns:a16="http://schemas.microsoft.com/office/drawing/2014/main" id="{3D83B7E3-5E3E-4B52-9783-A63ABE23FF22}"/>
+              </a:ext>
+            </a:extLst>
+          </p:cNvPr>
+          <p:cNvCxnSpPr>
+            <a:stCxn id="54" idx="3"/>
+            <a:endCxn id="55" idx="1"/>
+          </p:cNvCxnSpPr>
+          <p:nvPr/>
+        </p:nvCxnSpPr>
+        <p:spPr>
+          <a:xfrm>
+            <a:off x="1218736" y="2642216"/>
+            <a:ext cx="630551" cy="8444"/>
+          </a:xfrm>
+          <a:prstGeom prst="straightConnector1">
+            <a:avLst/>
+          </a:prstGeom>
+          <a:ln>
+            <a:solidFill>
+              <a:srgbClr val="00B050"/>
+            </a:solidFill>
+            <a:headEnd type="triangle"/>
+            <a:tailEnd type="none"/>
+          </a:ln>
+        </p:spPr>
+        <p:style>
+          <a:lnRef idx="1">
+            <a:schemeClr val="dk1"/>
+          </a:lnRef>
+          <a:fillRef idx="0">
+            <a:schemeClr val="dk1"/>
+          </a:fillRef>
+          <a:effectRef idx="0">
+            <a:schemeClr val="dk1"/>
+          </a:effectRef>
+          <a:fontRef idx="minor">
+            <a:schemeClr val="tx1"/>
+          </a:fontRef>
+        </p:style>
+      </p:cxnSp>
+      <p:sp>
+        <p:nvSpPr>
+          <p:cNvPr id="57" name="矩形 56">
+            <a:extLst>
+              <a:ext uri="{FF2B5EF4-FFF2-40B4-BE49-F238E27FC236}">
+                <a16:creationId xmlns:a16="http://schemas.microsoft.com/office/drawing/2014/main" id="{7463C318-1A5B-4B36-88DC-91365D06E83D}"/>
+              </a:ext>
+            </a:extLst>
+          </p:cNvPr>
+          <p:cNvSpPr/>
+          <p:nvPr/>
+        </p:nvSpPr>
+        <p:spPr>
+          <a:xfrm>
+            <a:off x="3124317" y="2483171"/>
+            <a:ext cx="688063" cy="334978"/>
+          </a:xfrm>
+          <a:prstGeom prst="rect">
+            <a:avLst/>
+          </a:prstGeom>
+        </p:spPr>
+        <p:style>
+          <a:lnRef idx="2">
+            <a:schemeClr val="dk1"/>
+          </a:lnRef>
+          <a:fillRef idx="1">
+            <a:schemeClr val="lt1"/>
+          </a:fillRef>
+          <a:effectRef idx="0">
+            <a:schemeClr val="dk1"/>
+          </a:effectRef>
+          <a:fontRef idx="minor">
+            <a:schemeClr val="dk1"/>
+          </a:fontRef>
+        </p:style>
+        <p:txBody>
+          <a:bodyPr rtlCol="0" anchor="ctr"/>
+          <a:lstStyle/>
+          <a:p>
+            <a:pPr algn="ctr"/>
+            <a:r>
+              <a:rPr lang="en-US" altLang="zh-CN" dirty="0">
+                <a:latin typeface="Times New Roman" panose="02020603050405020304" pitchFamily="18" charset="0"/>
+                <a:cs typeface="Times New Roman" panose="02020603050405020304" pitchFamily="18" charset="0"/>
+              </a:rPr>
+              <a:t>2</a:t>
+            </a:r>
+            <a:endParaRPr lang="zh-CN" altLang="en-US" dirty="0">
+              <a:latin typeface="Times New Roman" panose="02020603050405020304" pitchFamily="18" charset="0"/>
+              <a:cs typeface="Times New Roman" panose="02020603050405020304" pitchFamily="18" charset="0"/>
+            </a:endParaRPr>
+          </a:p>
+        </p:txBody>
+      </p:sp>
+      <p:sp>
+        <p:nvSpPr>
+          <p:cNvPr id="58" name="矩形 57">
+            <a:extLst>
+              <a:ext uri="{FF2B5EF4-FFF2-40B4-BE49-F238E27FC236}">
+                <a16:creationId xmlns:a16="http://schemas.microsoft.com/office/drawing/2014/main" id="{69256C95-6646-414B-A1C6-E243F9EADBF8}"/>
+              </a:ext>
+            </a:extLst>
+          </p:cNvPr>
+          <p:cNvSpPr/>
+          <p:nvPr/>
+        </p:nvSpPr>
+        <p:spPr>
+          <a:xfrm>
+            <a:off x="4399347" y="2483171"/>
+            <a:ext cx="688063" cy="334978"/>
+          </a:xfrm>
+          <a:prstGeom prst="rect">
+            <a:avLst/>
+          </a:prstGeom>
+        </p:spPr>
+        <p:style>
+          <a:lnRef idx="2">
+            <a:schemeClr val="dk1"/>
+          </a:lnRef>
+          <a:fillRef idx="1">
+            <a:schemeClr val="lt1"/>
+          </a:fillRef>
+          <a:effectRef idx="0">
+            <a:schemeClr val="dk1"/>
+          </a:effectRef>
+          <a:fontRef idx="minor">
+            <a:schemeClr val="dk1"/>
+          </a:fontRef>
+        </p:style>
+        <p:txBody>
+          <a:bodyPr rtlCol="0" anchor="ctr"/>
+          <a:lstStyle/>
+          <a:p>
+            <a:pPr algn="ctr"/>
+            <a:r>
+              <a:rPr lang="en-US" altLang="zh-CN" dirty="0">
+                <a:latin typeface="Times New Roman" panose="02020603050405020304" pitchFamily="18" charset="0"/>
+                <a:cs typeface="Times New Roman" panose="02020603050405020304" pitchFamily="18" charset="0"/>
+              </a:rPr>
+              <a:t>3</a:t>
+            </a:r>
+            <a:endParaRPr lang="zh-CN" altLang="en-US" dirty="0">
+              <a:latin typeface="Times New Roman" panose="02020603050405020304" pitchFamily="18" charset="0"/>
+              <a:cs typeface="Times New Roman" panose="02020603050405020304" pitchFamily="18" charset="0"/>
+            </a:endParaRPr>
+          </a:p>
+        </p:txBody>
+      </p:sp>
+      <p:cxnSp>
+        <p:nvCxnSpPr>
+          <p:cNvPr id="59" name="直接箭头连接符 58">
+            <a:extLst>
+              <a:ext uri="{FF2B5EF4-FFF2-40B4-BE49-F238E27FC236}">
+                <a16:creationId xmlns:a16="http://schemas.microsoft.com/office/drawing/2014/main" id="{377D4B2B-7A03-4D86-A533-443EAD77CDCE}"/>
+              </a:ext>
+            </a:extLst>
+          </p:cNvPr>
+          <p:cNvCxnSpPr>
+            <a:cxnSpLocks/>
+            <a:stCxn id="55" idx="3"/>
+            <a:endCxn id="57" idx="1"/>
+          </p:cNvCxnSpPr>
+          <p:nvPr/>
+        </p:nvCxnSpPr>
+        <p:spPr>
+          <a:xfrm>
+            <a:off x="2537350" y="2650660"/>
+            <a:ext cx="586967" cy="0"/>
+          </a:xfrm>
+          <a:prstGeom prst="straightConnector1">
+            <a:avLst/>
+          </a:prstGeom>
+          <a:ln>
+            <a:tailEnd type="triangle"/>
+          </a:ln>
+        </p:spPr>
+        <p:style>
+          <a:lnRef idx="1">
+            <a:schemeClr val="dk1"/>
+          </a:lnRef>
+          <a:fillRef idx="0">
+            <a:schemeClr val="dk1"/>
+          </a:fillRef>
+          <a:effectRef idx="0">
+            <a:schemeClr val="dk1"/>
+          </a:effectRef>
+          <a:fontRef idx="minor">
+            <a:schemeClr val="tx1"/>
+          </a:fontRef>
+        </p:style>
+      </p:cxnSp>
+      <p:cxnSp>
+        <p:nvCxnSpPr>
+          <p:cNvPr id="60" name="直接箭头连接符 59">
+            <a:extLst>
+              <a:ext uri="{FF2B5EF4-FFF2-40B4-BE49-F238E27FC236}">
+                <a16:creationId xmlns:a16="http://schemas.microsoft.com/office/drawing/2014/main" id="{60FA5220-D74F-40BE-A8E5-9E06291E1E2C}"/>
+              </a:ext>
+            </a:extLst>
+          </p:cNvPr>
+          <p:cNvCxnSpPr>
+            <a:cxnSpLocks/>
+            <a:stCxn id="57" idx="3"/>
+            <a:endCxn id="58" idx="1"/>
+          </p:cNvCxnSpPr>
+          <p:nvPr/>
+        </p:nvCxnSpPr>
+        <p:spPr>
+          <a:xfrm>
+            <a:off x="3812380" y="2650660"/>
+            <a:ext cx="586967" cy="0"/>
+          </a:xfrm>
+          <a:prstGeom prst="straightConnector1">
+            <a:avLst/>
+          </a:prstGeom>
+          <a:ln>
+            <a:tailEnd type="triangle"/>
+          </a:ln>
+        </p:spPr>
+        <p:style>
+          <a:lnRef idx="1">
+            <a:schemeClr val="dk1"/>
+          </a:lnRef>
+          <a:fillRef idx="0">
+            <a:schemeClr val="dk1"/>
+          </a:fillRef>
+          <a:effectRef idx="0">
+            <a:schemeClr val="dk1"/>
+          </a:effectRef>
+          <a:fontRef idx="minor">
+            <a:schemeClr val="tx1"/>
+          </a:fontRef>
+        </p:style>
+      </p:cxnSp>
+      <p:grpSp>
+        <p:nvGrpSpPr>
+          <p:cNvPr id="61" name="组合 60">
+            <a:extLst>
+              <a:ext uri="{FF2B5EF4-FFF2-40B4-BE49-F238E27FC236}">
+                <a16:creationId xmlns:a16="http://schemas.microsoft.com/office/drawing/2014/main" id="{CA8F327A-F7D0-469D-B0EF-C8ECF58B8AA0}"/>
+              </a:ext>
+            </a:extLst>
+          </p:cNvPr>
+          <p:cNvGrpSpPr/>
+          <p:nvPr/>
+        </p:nvGrpSpPr>
+        <p:grpSpPr>
+          <a:xfrm>
+            <a:off x="1802676" y="3028377"/>
+            <a:ext cx="807184" cy="585143"/>
+            <a:chOff x="2774174" y="2779414"/>
+            <a:chExt cx="807184" cy="585143"/>
+          </a:xfrm>
+        </p:grpSpPr>
+        <p:sp>
+          <p:nvSpPr>
+            <p:cNvPr id="62" name="文本框 61">
+              <a:extLst>
+                <a:ext uri="{FF2B5EF4-FFF2-40B4-BE49-F238E27FC236}">
+                  <a16:creationId xmlns:a16="http://schemas.microsoft.com/office/drawing/2014/main" id="{5B9A241B-7D0A-4DE6-A4A9-366FDAD793DC}"/>
+                </a:ext>
+              </a:extLst>
+            </p:cNvPr>
+            <p:cNvSpPr txBox="1"/>
+            <p:nvPr/>
+          </p:nvSpPr>
+          <p:spPr>
+            <a:xfrm>
+              <a:off x="2774174" y="3087558"/>
+              <a:ext cx="807184" cy="276999"/>
+            </a:xfrm>
+            <a:prstGeom prst="rect">
+              <a:avLst/>
+            </a:prstGeom>
+            <a:noFill/>
+          </p:spPr>
+          <p:txBody>
+            <a:bodyPr wrap="square" lIns="0" tIns="0" rIns="0" bIns="0" rtlCol="0">
+              <a:spAutoFit/>
+            </a:bodyPr>
+            <a:lstStyle/>
+            <a:p>
+              <a:pPr algn="ctr"/>
+              <a:r>
+                <a:rPr lang="en-US" altLang="zh-CN" dirty="0">
+                  <a:solidFill>
+                    <a:srgbClr val="00B050"/>
+                  </a:solidFill>
+                  <a:latin typeface="Times New Roman" panose="02020603050405020304" pitchFamily="18" charset="0"/>
+                  <a:ea typeface="宋体" panose="02010600030101010101" pitchFamily="2" charset="-122"/>
+                </a:rPr>
+                <a:t>left</a:t>
+              </a:r>
+              <a:endParaRPr lang="zh-CN" altLang="en-US" dirty="0">
+                <a:solidFill>
+                  <a:srgbClr val="00B050"/>
+                </a:solidFill>
+                <a:latin typeface="Times New Roman" panose="02020603050405020304" pitchFamily="18" charset="0"/>
+                <a:ea typeface="宋体" panose="02010600030101010101" pitchFamily="2" charset="-122"/>
+              </a:endParaRPr>
+            </a:p>
+          </p:txBody>
+        </p:sp>
+        <p:cxnSp>
+          <p:nvCxnSpPr>
+            <p:cNvPr id="63" name="直接箭头连接符 62">
+              <a:extLst>
+                <a:ext uri="{FF2B5EF4-FFF2-40B4-BE49-F238E27FC236}">
+                  <a16:creationId xmlns:a16="http://schemas.microsoft.com/office/drawing/2014/main" id="{D0F25FC8-BC81-472D-9134-5915F504348C}"/>
+                </a:ext>
+              </a:extLst>
+            </p:cNvPr>
+            <p:cNvCxnSpPr>
+              <a:cxnSpLocks/>
+              <a:stCxn id="62" idx="0"/>
+            </p:cNvCxnSpPr>
+            <p:nvPr/>
+          </p:nvCxnSpPr>
+          <p:spPr>
+            <a:xfrm flipV="1">
+              <a:off x="3177766" y="2779414"/>
+              <a:ext cx="0" cy="308144"/>
+            </a:xfrm>
+            <a:prstGeom prst="straightConnector1">
+              <a:avLst/>
+            </a:prstGeom>
+            <a:ln>
+              <a:solidFill>
+                <a:srgbClr val="00B050"/>
+              </a:solidFill>
+              <a:tailEnd type="triangle"/>
+            </a:ln>
+          </p:spPr>
+          <p:style>
+            <a:lnRef idx="1">
+              <a:schemeClr val="dk1"/>
+            </a:lnRef>
+            <a:fillRef idx="0">
+              <a:schemeClr val="dk1"/>
+            </a:fillRef>
+            <a:effectRef idx="0">
+              <a:schemeClr val="dk1"/>
+            </a:effectRef>
+            <a:fontRef idx="minor">
+              <a:schemeClr val="tx1"/>
+            </a:fontRef>
+          </p:style>
+        </p:cxnSp>
+      </p:grpSp>
+      <p:grpSp>
+        <p:nvGrpSpPr>
+          <p:cNvPr id="64" name="组合 63">
+            <a:extLst>
+              <a:ext uri="{FF2B5EF4-FFF2-40B4-BE49-F238E27FC236}">
+                <a16:creationId xmlns:a16="http://schemas.microsoft.com/office/drawing/2014/main" id="{8F225597-AB4B-4358-BFD5-7D185AB153AD}"/>
+              </a:ext>
+            </a:extLst>
+          </p:cNvPr>
+          <p:cNvGrpSpPr/>
+          <p:nvPr/>
+        </p:nvGrpSpPr>
+        <p:grpSpPr>
+          <a:xfrm>
+            <a:off x="3081519" y="3028377"/>
+            <a:ext cx="807184" cy="585143"/>
+            <a:chOff x="4053017" y="2779414"/>
+            <a:chExt cx="807184" cy="585143"/>
+          </a:xfrm>
+        </p:grpSpPr>
+        <p:sp>
+          <p:nvSpPr>
+            <p:cNvPr id="65" name="文本框 64">
+              <a:extLst>
+                <a:ext uri="{FF2B5EF4-FFF2-40B4-BE49-F238E27FC236}">
+                  <a16:creationId xmlns:a16="http://schemas.microsoft.com/office/drawing/2014/main" id="{9FA8EDC9-4FFD-4100-A24A-FEE4CE8792A4}"/>
+                </a:ext>
+              </a:extLst>
+            </p:cNvPr>
+            <p:cNvSpPr txBox="1"/>
+            <p:nvPr/>
+          </p:nvSpPr>
+          <p:spPr>
+            <a:xfrm>
+              <a:off x="4053017" y="3087558"/>
+              <a:ext cx="807184" cy="276999"/>
+            </a:xfrm>
+            <a:prstGeom prst="rect">
+              <a:avLst/>
+            </a:prstGeom>
+            <a:noFill/>
+          </p:spPr>
+          <p:txBody>
+            <a:bodyPr wrap="square" lIns="0" tIns="0" rIns="0" bIns="0" rtlCol="0">
+              <a:spAutoFit/>
+            </a:bodyPr>
+            <a:lstStyle/>
+            <a:p>
+              <a:pPr algn="ctr"/>
+              <a:r>
+                <a:rPr lang="en-US" altLang="zh-CN" dirty="0">
+                  <a:latin typeface="Times New Roman" panose="02020603050405020304" pitchFamily="18" charset="0"/>
+                  <a:ea typeface="宋体" panose="02010600030101010101" pitchFamily="2" charset="-122"/>
+                </a:rPr>
+                <a:t>right</a:t>
+              </a:r>
+              <a:endParaRPr lang="zh-CN" altLang="en-US" dirty="0">
+                <a:latin typeface="Times New Roman" panose="02020603050405020304" pitchFamily="18" charset="0"/>
+                <a:ea typeface="宋体" panose="02010600030101010101" pitchFamily="2" charset="-122"/>
+              </a:endParaRPr>
+            </a:p>
+          </p:txBody>
+        </p:sp>
+        <p:cxnSp>
+          <p:nvCxnSpPr>
+            <p:cNvPr id="66" name="直接箭头连接符 65">
+              <a:extLst>
+                <a:ext uri="{FF2B5EF4-FFF2-40B4-BE49-F238E27FC236}">
+                  <a16:creationId xmlns:a16="http://schemas.microsoft.com/office/drawing/2014/main" id="{E49BCCEE-BDDA-4169-B94E-8B9CEB9C4388}"/>
+                </a:ext>
+              </a:extLst>
+            </p:cNvPr>
+            <p:cNvCxnSpPr>
+              <a:cxnSpLocks/>
+            </p:cNvCxnSpPr>
+            <p:nvPr/>
+          </p:nvCxnSpPr>
+          <p:spPr>
+            <a:xfrm flipV="1">
+              <a:off x="4452796" y="2779414"/>
+              <a:ext cx="0" cy="308144"/>
+            </a:xfrm>
+            <a:prstGeom prst="straightConnector1">
+              <a:avLst/>
+            </a:prstGeom>
+            <a:ln>
+              <a:tailEnd type="triangle"/>
+            </a:ln>
+          </p:spPr>
+          <p:style>
+            <a:lnRef idx="1">
+              <a:schemeClr val="dk1"/>
+            </a:lnRef>
+            <a:fillRef idx="0">
+              <a:schemeClr val="dk1"/>
+            </a:fillRef>
+            <a:effectRef idx="0">
+              <a:schemeClr val="dk1"/>
+            </a:effectRef>
+            <a:fontRef idx="minor">
+              <a:schemeClr val="tx1"/>
+            </a:fontRef>
+          </p:style>
+        </p:cxnSp>
+      </p:grpSp>
+      <p:grpSp>
+        <p:nvGrpSpPr>
+          <p:cNvPr id="67" name="组合 66">
+            <a:extLst>
+              <a:ext uri="{FF2B5EF4-FFF2-40B4-BE49-F238E27FC236}">
+                <a16:creationId xmlns:a16="http://schemas.microsoft.com/office/drawing/2014/main" id="{08CA4E76-6383-4E2C-A7AA-E4C908E9C620}"/>
+              </a:ext>
+            </a:extLst>
+          </p:cNvPr>
+          <p:cNvGrpSpPr/>
+          <p:nvPr/>
+        </p:nvGrpSpPr>
+        <p:grpSpPr>
+          <a:xfrm>
+            <a:off x="1784487" y="1725418"/>
+            <a:ext cx="807184" cy="603681"/>
+            <a:chOff x="2781718" y="1504268"/>
+            <a:chExt cx="807184" cy="603681"/>
+          </a:xfrm>
+        </p:grpSpPr>
+        <p:sp>
+          <p:nvSpPr>
+            <p:cNvPr id="68" name="文本框 67">
+              <a:extLst>
+                <a:ext uri="{FF2B5EF4-FFF2-40B4-BE49-F238E27FC236}">
+                  <a16:creationId xmlns:a16="http://schemas.microsoft.com/office/drawing/2014/main" id="{F488ED07-0B71-41E0-A49F-69796906EB31}"/>
+                </a:ext>
+              </a:extLst>
+            </p:cNvPr>
+            <p:cNvSpPr txBox="1"/>
+            <p:nvPr/>
+          </p:nvSpPr>
+          <p:spPr>
+            <a:xfrm>
+              <a:off x="2781718" y="1504268"/>
+              <a:ext cx="807184" cy="276999"/>
+            </a:xfrm>
+            <a:prstGeom prst="rect">
+              <a:avLst/>
+            </a:prstGeom>
+            <a:noFill/>
+            <a:ln>
+              <a:noFill/>
+            </a:ln>
+          </p:spPr>
+          <p:txBody>
+            <a:bodyPr wrap="square" lIns="0" tIns="0" rIns="0" bIns="0" rtlCol="0">
+              <a:spAutoFit/>
+            </a:bodyPr>
+            <a:lstStyle/>
+            <a:p>
+              <a:pPr algn="ctr"/>
+              <a:r>
+                <a:rPr lang="en-US" altLang="zh-CN" dirty="0">
+                  <a:solidFill>
+                    <a:srgbClr val="FF0000"/>
+                  </a:solidFill>
+                  <a:latin typeface="Times New Roman" panose="02020603050405020304" pitchFamily="18" charset="0"/>
+                  <a:ea typeface="宋体" panose="02010600030101010101" pitchFamily="2" charset="-122"/>
+                </a:rPr>
+                <a:t>mid</a:t>
+              </a:r>
+              <a:endParaRPr lang="zh-CN" altLang="en-US" dirty="0">
+                <a:solidFill>
+                  <a:srgbClr val="FF0000"/>
+                </a:solidFill>
+                <a:latin typeface="Times New Roman" panose="02020603050405020304" pitchFamily="18" charset="0"/>
+                <a:ea typeface="宋体" panose="02010600030101010101" pitchFamily="2" charset="-122"/>
+              </a:endParaRPr>
+            </a:p>
+          </p:txBody>
+        </p:sp>
+        <p:cxnSp>
+          <p:nvCxnSpPr>
+            <p:cNvPr id="69" name="直接箭头连接符 68">
+              <a:extLst>
+                <a:ext uri="{FF2B5EF4-FFF2-40B4-BE49-F238E27FC236}">
+                  <a16:creationId xmlns:a16="http://schemas.microsoft.com/office/drawing/2014/main" id="{EBB6A261-AE89-4ADA-897E-0CF27F83BB26}"/>
+                </a:ext>
+              </a:extLst>
+            </p:cNvPr>
+            <p:cNvCxnSpPr>
+              <a:cxnSpLocks/>
+            </p:cNvCxnSpPr>
+            <p:nvPr/>
+          </p:nvCxnSpPr>
+          <p:spPr>
+            <a:xfrm>
+              <a:off x="3185310" y="1828800"/>
+              <a:ext cx="0" cy="279149"/>
+            </a:xfrm>
+            <a:prstGeom prst="straightConnector1">
+              <a:avLst/>
+            </a:prstGeom>
+            <a:ln>
+              <a:solidFill>
+                <a:srgbClr val="FF0000"/>
+              </a:solidFill>
+              <a:tailEnd type="triangle"/>
+            </a:ln>
+          </p:spPr>
+          <p:style>
+            <a:lnRef idx="1">
+              <a:schemeClr val="dk1"/>
+            </a:lnRef>
+            <a:fillRef idx="0">
+              <a:schemeClr val="dk1"/>
+            </a:fillRef>
+            <a:effectRef idx="0">
+              <a:schemeClr val="dk1"/>
+            </a:effectRef>
+            <a:fontRef idx="minor">
+              <a:schemeClr val="tx1"/>
+            </a:fontRef>
+          </p:style>
+        </p:cxnSp>
+      </p:grpSp>
+      <p:sp>
+        <p:nvSpPr>
+          <p:cNvPr id="72" name="文本框 71">
+            <a:extLst>
+              <a:ext uri="{FF2B5EF4-FFF2-40B4-BE49-F238E27FC236}">
+                <a16:creationId xmlns:a16="http://schemas.microsoft.com/office/drawing/2014/main" id="{1B00B531-8274-4743-ADDD-EFBA57BF78D1}"/>
+              </a:ext>
+            </a:extLst>
+          </p:cNvPr>
+          <p:cNvSpPr txBox="1"/>
+          <p:nvPr/>
+        </p:nvSpPr>
+        <p:spPr>
+          <a:xfrm>
+            <a:off x="1345454" y="2334439"/>
+            <a:ext cx="493784" cy="307777"/>
+          </a:xfrm>
+          <a:prstGeom prst="rect">
+            <a:avLst/>
+          </a:prstGeom>
+          <a:noFill/>
+        </p:spPr>
+        <p:txBody>
+          <a:bodyPr wrap="square" rtlCol="0">
+            <a:spAutoFit/>
+          </a:bodyPr>
+          <a:lstStyle/>
+          <a:p>
+            <a:pPr algn="ctr"/>
+            <a:r>
+              <a:rPr lang="zh-CN" altLang="en-US" sz="1400" dirty="0">
+                <a:latin typeface="Times New Roman" panose="02020603050405020304" pitchFamily="18" charset="0"/>
+                <a:ea typeface="宋体" panose="02010600030101010101" pitchFamily="2" charset="-122"/>
+              </a:rPr>
+              <a:t>②</a:t>
+            </a:r>
+          </a:p>
+        </p:txBody>
+      </p:sp>
+      <p:sp>
+        <p:nvSpPr>
+          <p:cNvPr id="73" name="文本框 72">
+            <a:extLst>
+              <a:ext uri="{FF2B5EF4-FFF2-40B4-BE49-F238E27FC236}">
+                <a16:creationId xmlns:a16="http://schemas.microsoft.com/office/drawing/2014/main" id="{890700F7-4080-4365-B9C0-34BD84B515EF}"/>
+              </a:ext>
+            </a:extLst>
+          </p:cNvPr>
+          <p:cNvSpPr txBox="1"/>
+          <p:nvPr/>
+        </p:nvSpPr>
+        <p:spPr>
+          <a:xfrm>
+            <a:off x="1328000" y="3892474"/>
+            <a:ext cx="493784" cy="307777"/>
+          </a:xfrm>
+          <a:prstGeom prst="rect">
+            <a:avLst/>
+          </a:prstGeom>
+          <a:noFill/>
+        </p:spPr>
+        <p:txBody>
+          <a:bodyPr wrap="square" rtlCol="0">
+            <a:spAutoFit/>
+          </a:bodyPr>
+          <a:lstStyle/>
+          <a:p>
+            <a:pPr algn="ctr"/>
+            <a:r>
+              <a:rPr lang="zh-CN" altLang="en-US" sz="1400" dirty="0">
+                <a:latin typeface="Times New Roman" panose="02020603050405020304" pitchFamily="18" charset="0"/>
+                <a:ea typeface="宋体" panose="02010600030101010101" pitchFamily="2" charset="-122"/>
+              </a:rPr>
+              <a:t>③</a:t>
+            </a:r>
+          </a:p>
+        </p:txBody>
+      </p:sp>
+      <p:sp>
+        <p:nvSpPr>
+          <p:cNvPr id="74" name="文本框 73">
+            <a:extLst>
+              <a:ext uri="{FF2B5EF4-FFF2-40B4-BE49-F238E27FC236}">
+                <a16:creationId xmlns:a16="http://schemas.microsoft.com/office/drawing/2014/main" id="{FCAE4BA0-5B99-4407-A42B-8241E7CD971E}"/>
+              </a:ext>
+            </a:extLst>
+          </p:cNvPr>
+          <p:cNvSpPr txBox="1"/>
+          <p:nvPr/>
+        </p:nvSpPr>
+        <p:spPr>
+          <a:xfrm>
+            <a:off x="2974564" y="3065175"/>
+            <a:ext cx="493784" cy="307777"/>
+          </a:xfrm>
+          <a:prstGeom prst="rect">
+            <a:avLst/>
+          </a:prstGeom>
+          <a:noFill/>
+        </p:spPr>
+        <p:txBody>
+          <a:bodyPr wrap="square" rtlCol="0">
+            <a:spAutoFit/>
+          </a:bodyPr>
+          <a:lstStyle/>
+          <a:p>
+            <a:pPr algn="ctr"/>
+            <a:r>
+              <a:rPr lang="zh-CN" altLang="en-US" sz="1400" dirty="0">
+                <a:latin typeface="Times New Roman" panose="02020603050405020304" pitchFamily="18" charset="0"/>
+                <a:ea typeface="宋体" panose="02010600030101010101" pitchFamily="2" charset="-122"/>
+              </a:rPr>
+              <a:t>①</a:t>
+            </a:r>
+          </a:p>
+        </p:txBody>
+      </p:sp>
+      <p:grpSp>
+        <p:nvGrpSpPr>
+          <p:cNvPr id="138" name="组合 137">
+            <a:extLst>
+              <a:ext uri="{FF2B5EF4-FFF2-40B4-BE49-F238E27FC236}">
+                <a16:creationId xmlns:a16="http://schemas.microsoft.com/office/drawing/2014/main" id="{7E63F792-CA9C-451D-8AB7-0CF712E605D9}"/>
+              </a:ext>
+            </a:extLst>
+          </p:cNvPr>
+          <p:cNvGrpSpPr/>
+          <p:nvPr/>
+        </p:nvGrpSpPr>
+        <p:grpSpPr>
+          <a:xfrm>
+            <a:off x="520816" y="3026988"/>
+            <a:ext cx="807184" cy="585143"/>
+            <a:chOff x="2774174" y="2779414"/>
+            <a:chExt cx="807184" cy="585143"/>
+          </a:xfrm>
+        </p:grpSpPr>
+        <p:sp>
+          <p:nvSpPr>
+            <p:cNvPr id="139" name="文本框 138">
+              <a:extLst>
+                <a:ext uri="{FF2B5EF4-FFF2-40B4-BE49-F238E27FC236}">
+                  <a16:creationId xmlns:a16="http://schemas.microsoft.com/office/drawing/2014/main" id="{499E59DF-B16D-4E7B-A155-499BB61E1856}"/>
+                </a:ext>
+              </a:extLst>
+            </p:cNvPr>
+            <p:cNvSpPr txBox="1"/>
+            <p:nvPr/>
+          </p:nvSpPr>
+          <p:spPr>
+            <a:xfrm>
+              <a:off x="2774174" y="3087558"/>
+              <a:ext cx="807184" cy="276999"/>
+            </a:xfrm>
+            <a:prstGeom prst="rect">
+              <a:avLst/>
+            </a:prstGeom>
+            <a:noFill/>
+            <a:ln>
+              <a:noFill/>
+            </a:ln>
+          </p:spPr>
+          <p:txBody>
+            <a:bodyPr wrap="square" lIns="0" tIns="0" rIns="0" bIns="0" rtlCol="0">
+              <a:spAutoFit/>
+            </a:bodyPr>
+            <a:lstStyle/>
+            <a:p>
+              <a:pPr algn="ctr"/>
+              <a:r>
+                <a:rPr lang="en-US" altLang="zh-CN" dirty="0">
+                  <a:solidFill>
+                    <a:srgbClr val="FF0000"/>
+                  </a:solidFill>
+                  <a:latin typeface="Times New Roman" panose="02020603050405020304" pitchFamily="18" charset="0"/>
+                  <a:ea typeface="宋体" panose="02010600030101010101" pitchFamily="2" charset="-122"/>
+                </a:rPr>
+                <a:t>left</a:t>
+              </a:r>
+              <a:endParaRPr lang="zh-CN" altLang="en-US" dirty="0">
+                <a:solidFill>
+                  <a:srgbClr val="FF0000"/>
+                </a:solidFill>
+                <a:latin typeface="Times New Roman" panose="02020603050405020304" pitchFamily="18" charset="0"/>
+                <a:ea typeface="宋体" panose="02010600030101010101" pitchFamily="2" charset="-122"/>
+              </a:endParaRPr>
+            </a:p>
+          </p:txBody>
+        </p:sp>
+        <p:cxnSp>
+          <p:nvCxnSpPr>
+            <p:cNvPr id="140" name="直接箭头连接符 139">
+              <a:extLst>
+                <a:ext uri="{FF2B5EF4-FFF2-40B4-BE49-F238E27FC236}">
+                  <a16:creationId xmlns:a16="http://schemas.microsoft.com/office/drawing/2014/main" id="{7128BC79-C5AC-4382-9017-08536A838553}"/>
+                </a:ext>
+              </a:extLst>
+            </p:cNvPr>
+            <p:cNvCxnSpPr>
+              <a:cxnSpLocks/>
+              <a:stCxn id="139" idx="0"/>
+            </p:cNvCxnSpPr>
+            <p:nvPr/>
+          </p:nvCxnSpPr>
+          <p:spPr>
+            <a:xfrm flipV="1">
+              <a:off x="3177766" y="2779414"/>
+              <a:ext cx="0" cy="308144"/>
+            </a:xfrm>
+            <a:prstGeom prst="straightConnector1">
+              <a:avLst/>
+            </a:prstGeom>
+            <a:ln>
+              <a:solidFill>
+                <a:srgbClr val="FF0000"/>
+              </a:solidFill>
+              <a:tailEnd type="triangle"/>
+            </a:ln>
+          </p:spPr>
+          <p:style>
+            <a:lnRef idx="1">
+              <a:schemeClr val="dk1"/>
+            </a:lnRef>
+            <a:fillRef idx="0">
+              <a:schemeClr val="dk1"/>
+            </a:fillRef>
+            <a:effectRef idx="0">
+              <a:schemeClr val="dk1"/>
+            </a:effectRef>
+            <a:fontRef idx="minor">
+              <a:schemeClr val="tx1"/>
+            </a:fontRef>
+          </p:style>
+        </p:cxnSp>
+      </p:grpSp>
+      <p:grpSp>
+        <p:nvGrpSpPr>
+          <p:cNvPr id="141" name="组合 140">
+            <a:extLst>
+              <a:ext uri="{FF2B5EF4-FFF2-40B4-BE49-F238E27FC236}">
+                <a16:creationId xmlns:a16="http://schemas.microsoft.com/office/drawing/2014/main" id="{53271D68-681D-4080-A505-63CC52E478A5}"/>
+              </a:ext>
+            </a:extLst>
+          </p:cNvPr>
+          <p:cNvGrpSpPr/>
+          <p:nvPr/>
+        </p:nvGrpSpPr>
+        <p:grpSpPr>
+          <a:xfrm>
+            <a:off x="3064756" y="1727600"/>
+            <a:ext cx="807184" cy="603681"/>
+            <a:chOff x="2781718" y="1504268"/>
+            <a:chExt cx="807184" cy="603681"/>
+          </a:xfrm>
+        </p:grpSpPr>
+        <p:sp>
+          <p:nvSpPr>
+            <p:cNvPr id="142" name="文本框 141">
+              <a:extLst>
+                <a:ext uri="{FF2B5EF4-FFF2-40B4-BE49-F238E27FC236}">
+                  <a16:creationId xmlns:a16="http://schemas.microsoft.com/office/drawing/2014/main" id="{684E7C94-9A94-46F2-BB73-8CC4D512716F}"/>
+                </a:ext>
+              </a:extLst>
+            </p:cNvPr>
+            <p:cNvSpPr txBox="1"/>
+            <p:nvPr/>
+          </p:nvSpPr>
+          <p:spPr>
+            <a:xfrm>
+              <a:off x="2781718" y="1504268"/>
+              <a:ext cx="807184" cy="276999"/>
+            </a:xfrm>
+            <a:prstGeom prst="rect">
+              <a:avLst/>
+            </a:prstGeom>
+            <a:noFill/>
+            <a:ln>
+              <a:noFill/>
+            </a:ln>
+          </p:spPr>
+          <p:txBody>
+            <a:bodyPr wrap="square" lIns="0" tIns="0" rIns="0" bIns="0" rtlCol="0">
+              <a:spAutoFit/>
+            </a:bodyPr>
+            <a:lstStyle/>
+            <a:p>
+              <a:pPr algn="ctr"/>
+              <a:r>
+                <a:rPr lang="en-US" altLang="zh-CN" dirty="0">
+                  <a:solidFill>
+                    <a:srgbClr val="00B050"/>
+                  </a:solidFill>
+                  <a:latin typeface="Times New Roman" panose="02020603050405020304" pitchFamily="18" charset="0"/>
+                  <a:ea typeface="宋体" panose="02010600030101010101" pitchFamily="2" charset="-122"/>
+                </a:rPr>
+                <a:t>mid</a:t>
+              </a:r>
+              <a:endParaRPr lang="zh-CN" altLang="en-US" dirty="0">
+                <a:solidFill>
+                  <a:srgbClr val="00B050"/>
+                </a:solidFill>
+                <a:latin typeface="Times New Roman" panose="02020603050405020304" pitchFamily="18" charset="0"/>
+                <a:ea typeface="宋体" panose="02010600030101010101" pitchFamily="2" charset="-122"/>
+              </a:endParaRPr>
+            </a:p>
+          </p:txBody>
+        </p:sp>
+        <p:cxnSp>
+          <p:nvCxnSpPr>
+            <p:cNvPr id="143" name="直接箭头连接符 142">
+              <a:extLst>
+                <a:ext uri="{FF2B5EF4-FFF2-40B4-BE49-F238E27FC236}">
+                  <a16:creationId xmlns:a16="http://schemas.microsoft.com/office/drawing/2014/main" id="{9DB63461-CB9F-433E-8F2F-9B85323B0C55}"/>
+                </a:ext>
+              </a:extLst>
+            </p:cNvPr>
+            <p:cNvCxnSpPr>
+              <a:cxnSpLocks/>
+            </p:cNvCxnSpPr>
+            <p:nvPr/>
+          </p:nvCxnSpPr>
+          <p:spPr>
+            <a:xfrm>
+              <a:off x="3185310" y="1828800"/>
+              <a:ext cx="0" cy="279149"/>
+            </a:xfrm>
+            <a:prstGeom prst="straightConnector1">
+              <a:avLst/>
+            </a:prstGeom>
+            <a:ln>
+              <a:solidFill>
+                <a:srgbClr val="00B050"/>
+              </a:solidFill>
+              <a:tailEnd type="triangle"/>
+            </a:ln>
+          </p:spPr>
+          <p:style>
+            <a:lnRef idx="1">
+              <a:schemeClr val="dk1"/>
+            </a:lnRef>
+            <a:fillRef idx="0">
+              <a:schemeClr val="dk1"/>
+            </a:fillRef>
+            <a:effectRef idx="0">
+              <a:schemeClr val="dk1"/>
+            </a:effectRef>
+            <a:fontRef idx="minor">
+              <a:schemeClr val="tx1"/>
+            </a:fontRef>
+          </p:style>
+        </p:cxnSp>
+      </p:grpSp>
+      <p:sp>
+        <p:nvSpPr>
+          <p:cNvPr id="145" name="文本框 144">
+            <a:extLst>
+              <a:ext uri="{FF2B5EF4-FFF2-40B4-BE49-F238E27FC236}">
+                <a16:creationId xmlns:a16="http://schemas.microsoft.com/office/drawing/2014/main" id="{6EB21C65-D2C5-47AD-BEE9-88053CDABE14}"/>
+              </a:ext>
+            </a:extLst>
+          </p:cNvPr>
+          <p:cNvSpPr txBox="1"/>
+          <p:nvPr/>
+        </p:nvSpPr>
+        <p:spPr>
+          <a:xfrm>
+            <a:off x="2587735" y="1170297"/>
+            <a:ext cx="493784" cy="307777"/>
+          </a:xfrm>
+          <a:prstGeom prst="rect">
+            <a:avLst/>
+          </a:prstGeom>
+          <a:noFill/>
+        </p:spPr>
+        <p:txBody>
+          <a:bodyPr wrap="square" rtlCol="0">
+            <a:spAutoFit/>
+          </a:bodyPr>
+          <a:lstStyle/>
+          <a:p>
+            <a:pPr algn="ctr"/>
+            <a:r>
+              <a:rPr lang="zh-CN" altLang="en-US" sz="1400" dirty="0">
+                <a:latin typeface="Times New Roman" panose="02020603050405020304" pitchFamily="18" charset="0"/>
+                <a:ea typeface="宋体" panose="02010600030101010101" pitchFamily="2" charset="-122"/>
+              </a:rPr>
+              <a:t>④</a:t>
+            </a:r>
+          </a:p>
+        </p:txBody>
+      </p:sp>
+      <p:cxnSp>
+        <p:nvCxnSpPr>
+          <p:cNvPr id="147" name="连接符: 曲线 146">
+            <a:extLst>
+              <a:ext uri="{FF2B5EF4-FFF2-40B4-BE49-F238E27FC236}">
+                <a16:creationId xmlns:a16="http://schemas.microsoft.com/office/drawing/2014/main" id="{2586A2A5-5F8D-4B31-8699-146D226A421F}"/>
+              </a:ext>
+            </a:extLst>
+          </p:cNvPr>
+          <p:cNvCxnSpPr>
+            <a:stCxn id="68" idx="0"/>
+            <a:endCxn id="142" idx="0"/>
+          </p:cNvCxnSpPr>
+          <p:nvPr/>
+        </p:nvCxnSpPr>
+        <p:spPr>
+          <a:xfrm rot="16200000" flipH="1">
+            <a:off x="2827122" y="1086375"/>
+            <a:ext cx="2182" cy="1280269"/>
+          </a:xfrm>
+          <a:prstGeom prst="curvedConnector3">
+            <a:avLst>
+              <a:gd name="adj1" fmla="val -10476627"/>
+            </a:avLst>
+          </a:prstGeom>
+          <a:ln w="19050">
+            <a:tailEnd type="triangle"/>
+          </a:ln>
+        </p:spPr>
+        <p:style>
+          <a:lnRef idx="1">
+            <a:schemeClr val="dk1"/>
+          </a:lnRef>
+          <a:fillRef idx="0">
+            <a:schemeClr val="dk1"/>
+          </a:fillRef>
+          <a:effectRef idx="0">
+            <a:schemeClr val="dk1"/>
+          </a:effectRef>
+          <a:fontRef idx="minor">
+            <a:schemeClr val="tx1"/>
+          </a:fontRef>
+        </p:style>
+      </p:cxnSp>
+      <p:cxnSp>
+        <p:nvCxnSpPr>
+          <p:cNvPr id="148" name="连接符: 曲线 147">
+            <a:extLst>
+              <a:ext uri="{FF2B5EF4-FFF2-40B4-BE49-F238E27FC236}">
+                <a16:creationId xmlns:a16="http://schemas.microsoft.com/office/drawing/2014/main" id="{548C6270-7CB3-46C9-97BB-BB4E9EB5E679}"/>
+              </a:ext>
+            </a:extLst>
+          </p:cNvPr>
+          <p:cNvCxnSpPr>
+            <a:cxnSpLocks/>
+            <a:stCxn id="139" idx="2"/>
+            <a:endCxn id="62" idx="2"/>
+          </p:cNvCxnSpPr>
+          <p:nvPr/>
+        </p:nvCxnSpPr>
+        <p:spPr>
+          <a:xfrm rot="16200000" flipH="1">
+            <a:off x="1564644" y="2971895"/>
+            <a:ext cx="1389" cy="1281860"/>
+          </a:xfrm>
+          <a:prstGeom prst="curvedConnector3">
+            <a:avLst>
+              <a:gd name="adj1" fmla="val 16557883"/>
+            </a:avLst>
+          </a:prstGeom>
+          <a:ln w="19050">
+            <a:tailEnd type="triangle"/>
+          </a:ln>
+        </p:spPr>
+        <p:style>
+          <a:lnRef idx="1">
+            <a:schemeClr val="dk1"/>
+          </a:lnRef>
+          <a:fillRef idx="0">
+            <a:schemeClr val="dk1"/>
+          </a:fillRef>
+          <a:effectRef idx="0">
+            <a:schemeClr val="dk1"/>
+          </a:effectRef>
+          <a:fontRef idx="minor">
+            <a:schemeClr val="tx1"/>
+          </a:fontRef>
+        </p:style>
+      </p:cxnSp>
+      <p:sp>
+        <p:nvSpPr>
+          <p:cNvPr id="151" name="矩形 150">
+            <a:extLst>
+              <a:ext uri="{FF2B5EF4-FFF2-40B4-BE49-F238E27FC236}">
+                <a16:creationId xmlns:a16="http://schemas.microsoft.com/office/drawing/2014/main" id="{84AA65F8-8A6C-492B-BB78-1A9600367E46}"/>
+              </a:ext>
+            </a:extLst>
+          </p:cNvPr>
+          <p:cNvSpPr/>
+          <p:nvPr/>
+        </p:nvSpPr>
+        <p:spPr>
+          <a:xfrm>
+            <a:off x="7052003" y="2494154"/>
+            <a:ext cx="688063" cy="334978"/>
+          </a:xfrm>
+          <a:prstGeom prst="rect">
+            <a:avLst/>
+          </a:prstGeom>
+          <a:ln>
+            <a:prstDash val="dash"/>
+          </a:ln>
+        </p:spPr>
+        <p:style>
+          <a:lnRef idx="2">
+            <a:schemeClr val="dk1"/>
+          </a:lnRef>
+          <a:fillRef idx="1">
+            <a:schemeClr val="lt1"/>
+          </a:fillRef>
+          <a:effectRef idx="0">
+            <a:schemeClr val="dk1"/>
+          </a:effectRef>
+          <a:fontRef idx="minor">
+            <a:schemeClr val="dk1"/>
+          </a:fontRef>
+        </p:style>
+        <p:txBody>
+          <a:bodyPr rtlCol="0" anchor="ctr"/>
+          <a:lstStyle/>
+          <a:p>
+            <a:pPr algn="ctr"/>
+            <a:endParaRPr lang="zh-CN" altLang="en-US" dirty="0">
+              <a:latin typeface="Times New Roman" panose="02020603050405020304" pitchFamily="18" charset="0"/>
+              <a:cs typeface="Times New Roman" panose="02020603050405020304" pitchFamily="18" charset="0"/>
+            </a:endParaRPr>
+          </a:p>
+        </p:txBody>
+      </p:sp>
+      <p:sp>
+        <p:nvSpPr>
+          <p:cNvPr id="152" name="矩形 151">
+            <a:extLst>
+              <a:ext uri="{FF2B5EF4-FFF2-40B4-BE49-F238E27FC236}">
+                <a16:creationId xmlns:a16="http://schemas.microsoft.com/office/drawing/2014/main" id="{583B1D04-B9CB-4150-912A-D90C6AC52A8B}"/>
+              </a:ext>
+            </a:extLst>
+          </p:cNvPr>
+          <p:cNvSpPr/>
+          <p:nvPr/>
+        </p:nvSpPr>
+        <p:spPr>
+          <a:xfrm>
+            <a:off x="5779200" y="2495807"/>
+            <a:ext cx="688063" cy="334978"/>
+          </a:xfrm>
+          <a:prstGeom prst="rect">
+            <a:avLst/>
+          </a:prstGeom>
+        </p:spPr>
+        <p:style>
+          <a:lnRef idx="2">
+            <a:schemeClr val="dk1"/>
+          </a:lnRef>
+          <a:fillRef idx="1">
+            <a:schemeClr val="lt1"/>
+          </a:fillRef>
+          <a:effectRef idx="0">
+            <a:schemeClr val="dk1"/>
+          </a:effectRef>
+          <a:fontRef idx="minor">
+            <a:schemeClr val="dk1"/>
+          </a:fontRef>
+        </p:style>
+        <p:txBody>
+          <a:bodyPr rtlCol="0" anchor="ctr"/>
+          <a:lstStyle/>
+          <a:p>
+            <a:pPr algn="ctr"/>
+            <a:r>
+              <a:rPr lang="en-US" altLang="zh-CN" dirty="0">
+                <a:latin typeface="Times New Roman" panose="02020603050405020304" pitchFamily="18" charset="0"/>
+                <a:cs typeface="Times New Roman" panose="02020603050405020304" pitchFamily="18" charset="0"/>
+              </a:rPr>
+              <a:t>4</a:t>
+            </a:r>
+            <a:endParaRPr lang="zh-CN" altLang="en-US" dirty="0">
+              <a:latin typeface="Times New Roman" panose="02020603050405020304" pitchFamily="18" charset="0"/>
+              <a:cs typeface="Times New Roman" panose="02020603050405020304" pitchFamily="18" charset="0"/>
+            </a:endParaRPr>
+          </a:p>
+        </p:txBody>
+      </p:sp>
+      <p:cxnSp>
+        <p:nvCxnSpPr>
+          <p:cNvPr id="153" name="直接箭头连接符 152">
+            <a:extLst>
+              <a:ext uri="{FF2B5EF4-FFF2-40B4-BE49-F238E27FC236}">
+                <a16:creationId xmlns:a16="http://schemas.microsoft.com/office/drawing/2014/main" id="{BF7CAAD7-5851-4BF6-B902-7FF345952986}"/>
+              </a:ext>
+            </a:extLst>
+          </p:cNvPr>
+          <p:cNvCxnSpPr>
+            <a:cxnSpLocks/>
+            <a:stCxn id="58" idx="3"/>
+            <a:endCxn id="152" idx="1"/>
+          </p:cNvCxnSpPr>
+          <p:nvPr/>
+        </p:nvCxnSpPr>
+        <p:spPr>
+          <a:xfrm>
+            <a:off x="5087410" y="2650660"/>
+            <a:ext cx="691790" cy="12636"/>
+          </a:xfrm>
+          <a:prstGeom prst="straightConnector1">
+            <a:avLst/>
+          </a:prstGeom>
+          <a:ln>
+            <a:solidFill>
+              <a:srgbClr val="00B050"/>
+            </a:solidFill>
+            <a:headEnd type="triangle"/>
+            <a:tailEnd type="none"/>
+          </a:ln>
+        </p:spPr>
+        <p:style>
+          <a:lnRef idx="1">
+            <a:schemeClr val="dk1"/>
+          </a:lnRef>
+          <a:fillRef idx="0">
+            <a:schemeClr val="dk1"/>
+          </a:fillRef>
+          <a:effectRef idx="0">
+            <a:schemeClr val="dk1"/>
+          </a:effectRef>
+          <a:fontRef idx="minor">
+            <a:schemeClr val="tx1"/>
+          </a:fontRef>
+        </p:style>
+      </p:cxnSp>
+      <p:grpSp>
+        <p:nvGrpSpPr>
+          <p:cNvPr id="187" name="组合 186">
+            <a:extLst>
+              <a:ext uri="{FF2B5EF4-FFF2-40B4-BE49-F238E27FC236}">
+                <a16:creationId xmlns:a16="http://schemas.microsoft.com/office/drawing/2014/main" id="{70EB24DA-6D59-4C33-83D5-3F54F29F25ED}"/>
+              </a:ext>
+            </a:extLst>
+          </p:cNvPr>
+          <p:cNvGrpSpPr/>
+          <p:nvPr/>
+        </p:nvGrpSpPr>
+        <p:grpSpPr>
+          <a:xfrm>
+            <a:off x="6992442" y="3026987"/>
+            <a:ext cx="807184" cy="585143"/>
+            <a:chOff x="4053017" y="2779414"/>
+            <a:chExt cx="807184" cy="585143"/>
+          </a:xfrm>
+        </p:grpSpPr>
+        <p:sp>
+          <p:nvSpPr>
+            <p:cNvPr id="188" name="文本框 187">
+              <a:extLst>
+                <a:ext uri="{FF2B5EF4-FFF2-40B4-BE49-F238E27FC236}">
+                  <a16:creationId xmlns:a16="http://schemas.microsoft.com/office/drawing/2014/main" id="{7327E41B-4D2B-4B62-81DD-7CE68D408669}"/>
+                </a:ext>
+              </a:extLst>
+            </p:cNvPr>
+            <p:cNvSpPr txBox="1"/>
+            <p:nvPr/>
+          </p:nvSpPr>
+          <p:spPr>
+            <a:xfrm>
+              <a:off x="4053017" y="3087558"/>
+              <a:ext cx="807184" cy="276999"/>
+            </a:xfrm>
+            <a:prstGeom prst="rect">
+              <a:avLst/>
+            </a:prstGeom>
+            <a:noFill/>
+          </p:spPr>
+          <p:txBody>
+            <a:bodyPr wrap="square" lIns="0" tIns="0" rIns="0" bIns="0" rtlCol="0">
+              <a:spAutoFit/>
+            </a:bodyPr>
+            <a:lstStyle/>
+            <a:p>
+              <a:pPr algn="ctr"/>
+              <a:r>
+                <a:rPr lang="en-US" altLang="zh-CN" dirty="0">
+                  <a:solidFill>
+                    <a:schemeClr val="accent2">
+                      <a:lumMod val="75000"/>
+                    </a:schemeClr>
+                  </a:solidFill>
+                  <a:latin typeface="Times New Roman" panose="02020603050405020304" pitchFamily="18" charset="0"/>
+                  <a:ea typeface="宋体" panose="02010600030101010101" pitchFamily="2" charset="-122"/>
+                </a:rPr>
+                <a:t>right</a:t>
+              </a:r>
+              <a:endParaRPr lang="zh-CN" altLang="en-US" dirty="0">
+                <a:solidFill>
+                  <a:schemeClr val="accent2">
+                    <a:lumMod val="75000"/>
+                  </a:schemeClr>
+                </a:solidFill>
+                <a:latin typeface="Times New Roman" panose="02020603050405020304" pitchFamily="18" charset="0"/>
+                <a:ea typeface="宋体" panose="02010600030101010101" pitchFamily="2" charset="-122"/>
+              </a:endParaRPr>
+            </a:p>
+          </p:txBody>
+        </p:sp>
+        <p:cxnSp>
+          <p:nvCxnSpPr>
+            <p:cNvPr id="189" name="直接箭头连接符 188">
+              <a:extLst>
+                <a:ext uri="{FF2B5EF4-FFF2-40B4-BE49-F238E27FC236}">
+                  <a16:creationId xmlns:a16="http://schemas.microsoft.com/office/drawing/2014/main" id="{B27B1B9D-AB3A-43D5-9ADD-ACE667083E5D}"/>
+                </a:ext>
+              </a:extLst>
+            </p:cNvPr>
+            <p:cNvCxnSpPr>
+              <a:cxnSpLocks/>
+            </p:cNvCxnSpPr>
+            <p:nvPr/>
+          </p:nvCxnSpPr>
+          <p:spPr>
+            <a:xfrm flipV="1">
+              <a:off x="4452796" y="2779414"/>
+              <a:ext cx="0" cy="308144"/>
+            </a:xfrm>
+            <a:prstGeom prst="straightConnector1">
+              <a:avLst/>
+            </a:prstGeom>
+            <a:ln>
+              <a:solidFill>
+                <a:schemeClr val="accent2">
+                  <a:lumMod val="75000"/>
+                </a:schemeClr>
+              </a:solidFill>
+              <a:tailEnd type="triangle"/>
+            </a:ln>
+          </p:spPr>
+          <p:style>
+            <a:lnRef idx="1">
+              <a:schemeClr val="dk1"/>
+            </a:lnRef>
+            <a:fillRef idx="0">
+              <a:schemeClr val="dk1"/>
+            </a:fillRef>
+            <a:effectRef idx="0">
+              <a:schemeClr val="dk1"/>
+            </a:effectRef>
+            <a:fontRef idx="minor">
+              <a:schemeClr val="tx1"/>
+            </a:fontRef>
+          </p:style>
+        </p:cxnSp>
+      </p:grpSp>
+      <p:grpSp>
+        <p:nvGrpSpPr>
+          <p:cNvPr id="190" name="组合 189">
+            <a:extLst>
+              <a:ext uri="{FF2B5EF4-FFF2-40B4-BE49-F238E27FC236}">
+                <a16:creationId xmlns:a16="http://schemas.microsoft.com/office/drawing/2014/main" id="{57C7D03A-7DC2-45BF-B5FA-3E4DF25A96D9}"/>
+              </a:ext>
+            </a:extLst>
+          </p:cNvPr>
+          <p:cNvGrpSpPr/>
+          <p:nvPr/>
+        </p:nvGrpSpPr>
+        <p:grpSpPr>
+          <a:xfrm>
+            <a:off x="6988629" y="1791545"/>
+            <a:ext cx="807184" cy="603681"/>
+            <a:chOff x="2781718" y="1504268"/>
+            <a:chExt cx="807184" cy="603681"/>
+          </a:xfrm>
+        </p:grpSpPr>
+        <p:sp>
+          <p:nvSpPr>
+            <p:cNvPr id="191" name="文本框 190">
+              <a:extLst>
+                <a:ext uri="{FF2B5EF4-FFF2-40B4-BE49-F238E27FC236}">
+                  <a16:creationId xmlns:a16="http://schemas.microsoft.com/office/drawing/2014/main" id="{2785E66F-B0D1-41DD-A397-61CF9439A9D8}"/>
+                </a:ext>
+              </a:extLst>
+            </p:cNvPr>
+            <p:cNvSpPr txBox="1"/>
+            <p:nvPr/>
+          </p:nvSpPr>
+          <p:spPr>
+            <a:xfrm>
+              <a:off x="2781718" y="1504268"/>
+              <a:ext cx="807184" cy="276999"/>
+            </a:xfrm>
+            <a:prstGeom prst="rect">
+              <a:avLst/>
+            </a:prstGeom>
+            <a:noFill/>
+            <a:ln>
+              <a:noFill/>
+            </a:ln>
+          </p:spPr>
+          <p:txBody>
+            <a:bodyPr wrap="square" lIns="0" tIns="0" rIns="0" bIns="0" rtlCol="0">
+              <a:spAutoFit/>
+            </a:bodyPr>
+            <a:lstStyle/>
+            <a:p>
+              <a:pPr algn="ctr"/>
+              <a:r>
+                <a:rPr lang="en-US" altLang="zh-CN" dirty="0">
+                  <a:solidFill>
+                    <a:schemeClr val="accent2">
+                      <a:lumMod val="75000"/>
+                    </a:schemeClr>
+                  </a:solidFill>
+                  <a:latin typeface="Times New Roman" panose="02020603050405020304" pitchFamily="18" charset="0"/>
+                  <a:ea typeface="宋体" panose="02010600030101010101" pitchFamily="2" charset="-122"/>
+                </a:rPr>
+                <a:t>mid</a:t>
+              </a:r>
+              <a:endParaRPr lang="zh-CN" altLang="en-US" dirty="0">
+                <a:solidFill>
+                  <a:schemeClr val="accent2">
+                    <a:lumMod val="75000"/>
+                  </a:schemeClr>
+                </a:solidFill>
+                <a:latin typeface="Times New Roman" panose="02020603050405020304" pitchFamily="18" charset="0"/>
+                <a:ea typeface="宋体" panose="02010600030101010101" pitchFamily="2" charset="-122"/>
+              </a:endParaRPr>
+            </a:p>
+          </p:txBody>
+        </p:sp>
+        <p:cxnSp>
+          <p:nvCxnSpPr>
+            <p:cNvPr id="192" name="直接箭头连接符 191">
+              <a:extLst>
+                <a:ext uri="{FF2B5EF4-FFF2-40B4-BE49-F238E27FC236}">
+                  <a16:creationId xmlns:a16="http://schemas.microsoft.com/office/drawing/2014/main" id="{17396845-3B49-4637-8B57-5EF1D55A680F}"/>
+                </a:ext>
+              </a:extLst>
+            </p:cNvPr>
+            <p:cNvCxnSpPr>
+              <a:cxnSpLocks/>
+            </p:cNvCxnSpPr>
+            <p:nvPr/>
+          </p:nvCxnSpPr>
+          <p:spPr>
+            <a:xfrm>
+              <a:off x="3185310" y="1828800"/>
+              <a:ext cx="0" cy="279149"/>
+            </a:xfrm>
+            <a:prstGeom prst="straightConnector1">
+              <a:avLst/>
+            </a:prstGeom>
+            <a:ln>
+              <a:solidFill>
+                <a:schemeClr val="accent2">
+                  <a:lumMod val="75000"/>
+                </a:schemeClr>
+              </a:solidFill>
+              <a:tailEnd type="triangle"/>
+            </a:ln>
+          </p:spPr>
+          <p:style>
+            <a:lnRef idx="1">
+              <a:schemeClr val="dk1"/>
+            </a:lnRef>
+            <a:fillRef idx="0">
+              <a:schemeClr val="dk1"/>
+            </a:fillRef>
+            <a:effectRef idx="0">
+              <a:schemeClr val="dk1"/>
+            </a:effectRef>
+            <a:fontRef idx="minor">
+              <a:schemeClr val="tx1"/>
+            </a:fontRef>
+          </p:style>
+        </p:cxnSp>
+      </p:grpSp>
+      <p:grpSp>
+        <p:nvGrpSpPr>
+          <p:cNvPr id="194" name="组合 193">
+            <a:extLst>
+              <a:ext uri="{FF2B5EF4-FFF2-40B4-BE49-F238E27FC236}">
+                <a16:creationId xmlns:a16="http://schemas.microsoft.com/office/drawing/2014/main" id="{C0560F89-6A52-4663-9ED2-AE57FF1D1CDD}"/>
+              </a:ext>
+            </a:extLst>
+          </p:cNvPr>
+          <p:cNvGrpSpPr/>
+          <p:nvPr/>
+        </p:nvGrpSpPr>
+        <p:grpSpPr>
+          <a:xfrm>
+            <a:off x="5717412" y="3026987"/>
+            <a:ext cx="807184" cy="585143"/>
+            <a:chOff x="4053017" y="2779414"/>
+            <a:chExt cx="807184" cy="585143"/>
+          </a:xfrm>
+        </p:grpSpPr>
+        <p:sp>
+          <p:nvSpPr>
+            <p:cNvPr id="195" name="文本框 194">
+              <a:extLst>
+                <a:ext uri="{FF2B5EF4-FFF2-40B4-BE49-F238E27FC236}">
+                  <a16:creationId xmlns:a16="http://schemas.microsoft.com/office/drawing/2014/main" id="{BB7D5F82-DCD6-410E-AC6C-C50CEE622C88}"/>
+                </a:ext>
+              </a:extLst>
+            </p:cNvPr>
+            <p:cNvSpPr txBox="1"/>
+            <p:nvPr/>
+          </p:nvSpPr>
+          <p:spPr>
+            <a:xfrm>
+              <a:off x="4053017" y="3087558"/>
+              <a:ext cx="807184" cy="276999"/>
+            </a:xfrm>
+            <a:prstGeom prst="rect">
+              <a:avLst/>
+            </a:prstGeom>
+            <a:noFill/>
+          </p:spPr>
+          <p:txBody>
+            <a:bodyPr wrap="square" lIns="0" tIns="0" rIns="0" bIns="0" rtlCol="0">
+              <a:spAutoFit/>
+            </a:bodyPr>
+            <a:lstStyle/>
+            <a:p>
+              <a:pPr algn="ctr"/>
+              <a:r>
+                <a:rPr lang="en-US" altLang="zh-CN" dirty="0">
+                  <a:solidFill>
+                    <a:schemeClr val="accent2">
+                      <a:lumMod val="75000"/>
+                    </a:schemeClr>
+                  </a:solidFill>
+                  <a:latin typeface="Times New Roman" panose="02020603050405020304" pitchFamily="18" charset="0"/>
+                  <a:ea typeface="宋体" panose="02010600030101010101" pitchFamily="2" charset="-122"/>
+                </a:rPr>
+                <a:t>left</a:t>
+              </a:r>
+              <a:endParaRPr lang="zh-CN" altLang="en-US" dirty="0">
+                <a:solidFill>
+                  <a:schemeClr val="accent2">
+                    <a:lumMod val="75000"/>
+                  </a:schemeClr>
+                </a:solidFill>
+                <a:latin typeface="Times New Roman" panose="02020603050405020304" pitchFamily="18" charset="0"/>
+                <a:ea typeface="宋体" panose="02010600030101010101" pitchFamily="2" charset="-122"/>
+              </a:endParaRPr>
+            </a:p>
+          </p:txBody>
+        </p:sp>
+        <p:cxnSp>
+          <p:nvCxnSpPr>
+            <p:cNvPr id="196" name="直接箭头连接符 195">
+              <a:extLst>
+                <a:ext uri="{FF2B5EF4-FFF2-40B4-BE49-F238E27FC236}">
+                  <a16:creationId xmlns:a16="http://schemas.microsoft.com/office/drawing/2014/main" id="{3BFBB47A-58C1-4EE9-976A-8E91EB654F2A}"/>
+                </a:ext>
+              </a:extLst>
+            </p:cNvPr>
+            <p:cNvCxnSpPr>
+              <a:cxnSpLocks/>
+            </p:cNvCxnSpPr>
+            <p:nvPr/>
+          </p:nvCxnSpPr>
+          <p:spPr>
+            <a:xfrm flipV="1">
+              <a:off x="4452796" y="2779414"/>
+              <a:ext cx="0" cy="308144"/>
+            </a:xfrm>
+            <a:prstGeom prst="straightConnector1">
+              <a:avLst/>
+            </a:prstGeom>
+            <a:ln>
+              <a:solidFill>
+                <a:schemeClr val="accent2">
+                  <a:lumMod val="75000"/>
+                </a:schemeClr>
+              </a:solidFill>
+              <a:tailEnd type="triangle"/>
+            </a:ln>
+          </p:spPr>
+          <p:style>
+            <a:lnRef idx="1">
+              <a:schemeClr val="dk1"/>
+            </a:lnRef>
+            <a:fillRef idx="0">
+              <a:schemeClr val="dk1"/>
+            </a:fillRef>
+            <a:effectRef idx="0">
+              <a:schemeClr val="dk1"/>
+            </a:effectRef>
+            <a:fontRef idx="minor">
+              <a:schemeClr val="tx1"/>
+            </a:fontRef>
+          </p:style>
+        </p:cxnSp>
+      </p:grpSp>
+      <p:sp>
+        <p:nvSpPr>
+          <p:cNvPr id="197" name="文本框 196">
+            <a:extLst>
+              <a:ext uri="{FF2B5EF4-FFF2-40B4-BE49-F238E27FC236}">
+                <a16:creationId xmlns:a16="http://schemas.microsoft.com/office/drawing/2014/main" id="{2D90131C-6A35-49C5-9A9B-8E26E629FBFB}"/>
+              </a:ext>
+            </a:extLst>
+          </p:cNvPr>
+          <p:cNvSpPr txBox="1"/>
+          <p:nvPr/>
+        </p:nvSpPr>
+        <p:spPr>
+          <a:xfrm>
+            <a:off x="6855248" y="3065174"/>
+            <a:ext cx="493784" cy="307777"/>
+          </a:xfrm>
+          <a:prstGeom prst="rect">
+            <a:avLst/>
+          </a:prstGeom>
+          <a:noFill/>
+        </p:spPr>
+        <p:txBody>
+          <a:bodyPr wrap="square" rtlCol="0">
+            <a:spAutoFit/>
+          </a:bodyPr>
+          <a:lstStyle/>
+          <a:p>
+            <a:pPr algn="ctr"/>
+            <a:r>
+              <a:rPr lang="en-US" altLang="zh-CN" sz="1400" dirty="0">
+                <a:latin typeface="Times New Roman" panose="02020603050405020304" pitchFamily="18" charset="0"/>
+                <a:ea typeface="宋体" panose="02010600030101010101" pitchFamily="2" charset="-122"/>
+              </a:rPr>
+              <a:t>A</a:t>
+            </a:r>
+          </a:p>
+        </p:txBody>
+      </p:sp>
+      <p:sp>
+        <p:nvSpPr>
+          <p:cNvPr id="199" name="文本框 198">
+            <a:extLst>
+              <a:ext uri="{FF2B5EF4-FFF2-40B4-BE49-F238E27FC236}">
+                <a16:creationId xmlns:a16="http://schemas.microsoft.com/office/drawing/2014/main" id="{CB788166-1570-4B54-8384-87DC51F0763B}"/>
+              </a:ext>
+            </a:extLst>
+          </p:cNvPr>
+          <p:cNvSpPr txBox="1"/>
+          <p:nvPr/>
+        </p:nvSpPr>
+        <p:spPr>
+          <a:xfrm>
+            <a:off x="6524596" y="1203402"/>
+            <a:ext cx="493784" cy="307777"/>
+          </a:xfrm>
+          <a:prstGeom prst="rect">
+            <a:avLst/>
+          </a:prstGeom>
+          <a:noFill/>
+        </p:spPr>
+        <p:txBody>
+          <a:bodyPr wrap="square" rtlCol="0">
+            <a:spAutoFit/>
+          </a:bodyPr>
+          <a:lstStyle/>
+          <a:p>
+            <a:pPr algn="ctr"/>
+            <a:r>
+              <a:rPr lang="en-US" altLang="zh-CN" sz="1400" dirty="0">
+                <a:latin typeface="Times New Roman" panose="02020603050405020304" pitchFamily="18" charset="0"/>
+                <a:ea typeface="宋体" panose="02010600030101010101" pitchFamily="2" charset="-122"/>
+              </a:rPr>
+              <a:t>D</a:t>
+            </a:r>
+            <a:endParaRPr lang="zh-CN" altLang="en-US" sz="1400" dirty="0">
+              <a:latin typeface="Times New Roman" panose="02020603050405020304" pitchFamily="18" charset="0"/>
+              <a:ea typeface="宋体" panose="02010600030101010101" pitchFamily="2" charset="-122"/>
+            </a:endParaRPr>
+          </a:p>
+        </p:txBody>
+      </p:sp>
+      <p:cxnSp>
+        <p:nvCxnSpPr>
+          <p:cNvPr id="200" name="连接符: 曲线 199">
+            <a:extLst>
+              <a:ext uri="{FF2B5EF4-FFF2-40B4-BE49-F238E27FC236}">
+                <a16:creationId xmlns:a16="http://schemas.microsoft.com/office/drawing/2014/main" id="{201DEC56-EC16-4C32-A3CA-1E68BDDE5F07}"/>
+              </a:ext>
+            </a:extLst>
+          </p:cNvPr>
+          <p:cNvCxnSpPr/>
+          <p:nvPr/>
+        </p:nvCxnSpPr>
+        <p:spPr>
+          <a:xfrm rot="16200000" flipH="1">
+            <a:off x="6760048" y="1135915"/>
+            <a:ext cx="2182" cy="1280269"/>
+          </a:xfrm>
+          <a:prstGeom prst="curvedConnector3">
+            <a:avLst>
+              <a:gd name="adj1" fmla="val -10476627"/>
+            </a:avLst>
+          </a:prstGeom>
+          <a:ln w="19050">
+            <a:prstDash val="dash"/>
+            <a:tailEnd type="triangle"/>
+          </a:ln>
+        </p:spPr>
+        <p:style>
+          <a:lnRef idx="1">
+            <a:schemeClr val="dk1"/>
+          </a:lnRef>
+          <a:fillRef idx="0">
+            <a:schemeClr val="dk1"/>
+          </a:fillRef>
+          <a:effectRef idx="0">
+            <a:schemeClr val="dk1"/>
+          </a:effectRef>
+          <a:fontRef idx="minor">
+            <a:schemeClr val="tx1"/>
+          </a:fontRef>
+        </p:style>
+      </p:cxnSp>
+      <p:cxnSp>
+        <p:nvCxnSpPr>
+          <p:cNvPr id="201" name="连接符: 曲线 200">
+            <a:extLst>
+              <a:ext uri="{FF2B5EF4-FFF2-40B4-BE49-F238E27FC236}">
+                <a16:creationId xmlns:a16="http://schemas.microsoft.com/office/drawing/2014/main" id="{54088683-2A2B-44FD-A6E4-82597FD364BD}"/>
+              </a:ext>
+            </a:extLst>
+          </p:cNvPr>
+          <p:cNvCxnSpPr>
+            <a:cxnSpLocks/>
+          </p:cNvCxnSpPr>
+          <p:nvPr/>
+        </p:nvCxnSpPr>
+        <p:spPr>
+          <a:xfrm rot="16200000" flipH="1">
+            <a:off x="5475566" y="3012590"/>
+            <a:ext cx="1389" cy="1281860"/>
+          </a:xfrm>
+          <a:prstGeom prst="curvedConnector3">
+            <a:avLst>
+              <a:gd name="adj1" fmla="val 16557883"/>
+            </a:avLst>
+          </a:prstGeom>
+          <a:ln w="19050">
+            <a:prstDash val="dash"/>
+            <a:tailEnd type="triangle"/>
+          </a:ln>
+        </p:spPr>
+        <p:style>
+          <a:lnRef idx="1">
+            <a:schemeClr val="dk1"/>
+          </a:lnRef>
+          <a:fillRef idx="0">
+            <a:schemeClr val="dk1"/>
+          </a:fillRef>
+          <a:effectRef idx="0">
+            <a:schemeClr val="dk1"/>
+          </a:effectRef>
+          <a:fontRef idx="minor">
+            <a:schemeClr val="tx1"/>
+          </a:fontRef>
+        </p:style>
+      </p:cxnSp>
+      <p:sp>
+        <p:nvSpPr>
+          <p:cNvPr id="202" name="文本框 201">
+            <a:extLst>
+              <a:ext uri="{FF2B5EF4-FFF2-40B4-BE49-F238E27FC236}">
+                <a16:creationId xmlns:a16="http://schemas.microsoft.com/office/drawing/2014/main" id="{48C8C4D3-3539-438D-A7B5-9A7928CFC4DD}"/>
+              </a:ext>
+            </a:extLst>
+          </p:cNvPr>
+          <p:cNvSpPr txBox="1"/>
+          <p:nvPr/>
+        </p:nvSpPr>
+        <p:spPr>
+          <a:xfrm>
+            <a:off x="5223628" y="3962587"/>
+            <a:ext cx="493784" cy="307777"/>
+          </a:xfrm>
+          <a:prstGeom prst="rect">
+            <a:avLst/>
+          </a:prstGeom>
+          <a:noFill/>
+        </p:spPr>
+        <p:txBody>
+          <a:bodyPr wrap="square" rtlCol="0">
+            <a:spAutoFit/>
+          </a:bodyPr>
+          <a:lstStyle/>
+          <a:p>
+            <a:pPr algn="ctr"/>
+            <a:r>
+              <a:rPr lang="en-US" altLang="zh-CN" sz="1400" dirty="0">
+                <a:latin typeface="Times New Roman" panose="02020603050405020304" pitchFamily="18" charset="0"/>
+                <a:ea typeface="宋体" panose="02010600030101010101" pitchFamily="2" charset="-122"/>
+              </a:rPr>
+              <a:t>C</a:t>
+            </a:r>
+            <a:endParaRPr lang="zh-CN" altLang="en-US" sz="1400" dirty="0">
+              <a:latin typeface="Times New Roman" panose="02020603050405020304" pitchFamily="18" charset="0"/>
+              <a:ea typeface="宋体" panose="02010600030101010101" pitchFamily="2" charset="-122"/>
+            </a:endParaRPr>
+          </a:p>
+        </p:txBody>
+      </p:sp>
+      <p:sp>
+        <p:nvSpPr>
+          <p:cNvPr id="203" name="文本框 202">
+            <a:extLst>
+              <a:ext uri="{FF2B5EF4-FFF2-40B4-BE49-F238E27FC236}">
+                <a16:creationId xmlns:a16="http://schemas.microsoft.com/office/drawing/2014/main" id="{EB8BB068-A554-4E60-B857-C94A3D8D9C97}"/>
+              </a:ext>
+            </a:extLst>
+          </p:cNvPr>
+          <p:cNvSpPr txBox="1"/>
+          <p:nvPr/>
+        </p:nvSpPr>
+        <p:spPr>
+          <a:xfrm>
+            <a:off x="5225366" y="2317411"/>
+            <a:ext cx="493784" cy="307777"/>
+          </a:xfrm>
+          <a:prstGeom prst="rect">
+            <a:avLst/>
+          </a:prstGeom>
+          <a:noFill/>
+        </p:spPr>
+        <p:txBody>
+          <a:bodyPr wrap="square" rtlCol="0">
+            <a:spAutoFit/>
+          </a:bodyPr>
+          <a:lstStyle/>
+          <a:p>
+            <a:pPr algn="ctr"/>
+            <a:r>
+              <a:rPr lang="en-US" altLang="zh-CN" sz="1400" dirty="0">
+                <a:latin typeface="Times New Roman" panose="02020603050405020304" pitchFamily="18" charset="0"/>
+                <a:ea typeface="宋体" panose="02010600030101010101" pitchFamily="2" charset="-122"/>
+              </a:rPr>
+              <a:t>B</a:t>
+            </a:r>
+            <a:endParaRPr lang="zh-CN" altLang="en-US" sz="1400" dirty="0">
+              <a:latin typeface="Times New Roman" panose="02020603050405020304" pitchFamily="18" charset="0"/>
+              <a:ea typeface="宋体" panose="02010600030101010101" pitchFamily="2" charset="-122"/>
+            </a:endParaRPr>
+          </a:p>
+        </p:txBody>
+      </p:sp>
+      <p:grpSp>
+        <p:nvGrpSpPr>
+          <p:cNvPr id="213" name="组合 212">
+            <a:extLst>
+              <a:ext uri="{FF2B5EF4-FFF2-40B4-BE49-F238E27FC236}">
+                <a16:creationId xmlns:a16="http://schemas.microsoft.com/office/drawing/2014/main" id="{DC5118B3-74C2-4453-8160-4CB43DE86465}"/>
+              </a:ext>
+            </a:extLst>
+          </p:cNvPr>
+          <p:cNvGrpSpPr/>
+          <p:nvPr/>
+        </p:nvGrpSpPr>
+        <p:grpSpPr>
+          <a:xfrm>
+            <a:off x="2188078" y="4619268"/>
+            <a:ext cx="5733294" cy="1815882"/>
+            <a:chOff x="1619681" y="4601659"/>
+            <a:chExt cx="5733294" cy="1815882"/>
+          </a:xfrm>
+        </p:grpSpPr>
+        <p:sp>
+          <p:nvSpPr>
+            <p:cNvPr id="204" name="文本框 203">
+              <a:extLst>
+                <a:ext uri="{FF2B5EF4-FFF2-40B4-BE49-F238E27FC236}">
+                  <a16:creationId xmlns:a16="http://schemas.microsoft.com/office/drawing/2014/main" id="{89F48D6C-6C8B-473F-A49E-FE654FF90543}"/>
+                </a:ext>
+              </a:extLst>
+            </p:cNvPr>
+            <p:cNvSpPr txBox="1"/>
+            <p:nvPr/>
+          </p:nvSpPr>
+          <p:spPr>
+            <a:xfrm>
+              <a:off x="2206268" y="4601659"/>
+              <a:ext cx="5146707" cy="1815882"/>
+            </a:xfrm>
+            <a:prstGeom prst="rect">
+              <a:avLst/>
+            </a:prstGeom>
+            <a:noFill/>
+          </p:spPr>
+          <p:txBody>
+            <a:bodyPr wrap="square" rtlCol="0">
+              <a:spAutoFit/>
+            </a:bodyPr>
+            <a:lstStyle/>
+            <a:p>
+              <a:pPr algn="l"/>
+              <a:r>
+                <a:rPr lang="en-US" altLang="zh-CN" sz="1400" dirty="0" err="1">
+                  <a:latin typeface="Consolas" panose="020B0609020204030204" pitchFamily="49" charset="0"/>
+                </a:rPr>
+                <a:t>ListNode</a:t>
+              </a:r>
+              <a:r>
+                <a:rPr lang="en-US" altLang="zh-CN" sz="1400" dirty="0">
+                  <a:latin typeface="Consolas" panose="020B0609020204030204" pitchFamily="49" charset="0"/>
+                </a:rPr>
+                <a:t>* </a:t>
+              </a:r>
+              <a:r>
+                <a:rPr lang="en-US" altLang="zh-CN" sz="1400" dirty="0">
+                  <a:solidFill>
+                    <a:srgbClr val="00B050"/>
+                  </a:solidFill>
+                  <a:latin typeface="Consolas" panose="020B0609020204030204" pitchFamily="49" charset="0"/>
+                </a:rPr>
+                <a:t>left</a:t>
+              </a:r>
+              <a:r>
+                <a:rPr lang="en-US" altLang="zh-CN" sz="1400" dirty="0">
+                  <a:latin typeface="Consolas" panose="020B0609020204030204" pitchFamily="49" charset="0"/>
+                </a:rPr>
+                <a:t>=</a:t>
+              </a:r>
+              <a:r>
+                <a:rPr lang="en-US" altLang="zh-CN" sz="1400" dirty="0" err="1">
+                  <a:latin typeface="Consolas" panose="020B0609020204030204" pitchFamily="49" charset="0"/>
+                </a:rPr>
+                <a:t>nullptr</a:t>
+              </a:r>
+              <a:r>
+                <a:rPr lang="en-US" altLang="zh-CN" sz="1400" dirty="0">
+                  <a:latin typeface="Consolas" panose="020B0609020204030204" pitchFamily="49" charset="0"/>
+                </a:rPr>
+                <a:t>, *</a:t>
+              </a:r>
+              <a:r>
+                <a:rPr lang="en-US" altLang="zh-CN" sz="1400" dirty="0">
+                  <a:solidFill>
+                    <a:srgbClr val="00B0F0"/>
+                  </a:solidFill>
+                  <a:latin typeface="Consolas" panose="020B0609020204030204" pitchFamily="49" charset="0"/>
+                </a:rPr>
+                <a:t>mid</a:t>
+              </a:r>
+              <a:r>
+                <a:rPr lang="en-US" altLang="zh-CN" sz="1400" dirty="0">
+                  <a:latin typeface="Consolas" panose="020B0609020204030204" pitchFamily="49" charset="0"/>
+                </a:rPr>
+                <a:t>=head, *</a:t>
+              </a:r>
+              <a:r>
+                <a:rPr lang="en-US" altLang="zh-CN" sz="1400" dirty="0">
+                  <a:solidFill>
+                    <a:schemeClr val="accent2">
+                      <a:lumMod val="75000"/>
+                    </a:schemeClr>
+                  </a:solidFill>
+                  <a:latin typeface="Consolas" panose="020B0609020204030204" pitchFamily="49" charset="0"/>
+                </a:rPr>
+                <a:t>right</a:t>
+              </a:r>
+              <a:r>
+                <a:rPr lang="en-US" altLang="zh-CN" sz="1400" dirty="0">
+                  <a:latin typeface="Consolas" panose="020B0609020204030204" pitchFamily="49" charset="0"/>
+                </a:rPr>
+                <a:t>;</a:t>
+              </a:r>
+            </a:p>
+            <a:p>
+              <a:pPr algn="l"/>
+              <a:r>
+                <a:rPr lang="en-US" altLang="zh-CN" sz="1400" dirty="0">
+                  <a:latin typeface="Consolas" panose="020B0609020204030204" pitchFamily="49" charset="0"/>
+                </a:rPr>
+                <a:t>while (</a:t>
+              </a:r>
+              <a:r>
+                <a:rPr lang="en-US" altLang="zh-CN" sz="1400" dirty="0">
+                  <a:solidFill>
+                    <a:srgbClr val="00B0F0"/>
+                  </a:solidFill>
+                  <a:latin typeface="Consolas" panose="020B0609020204030204" pitchFamily="49" charset="0"/>
+                </a:rPr>
+                <a:t>mid</a:t>
+              </a:r>
+              <a:r>
+                <a:rPr lang="en-US" altLang="zh-CN" sz="1400" dirty="0">
+                  <a:latin typeface="Consolas" panose="020B0609020204030204" pitchFamily="49" charset="0"/>
+                </a:rPr>
+                <a:t>) {</a:t>
+              </a:r>
+            </a:p>
+            <a:p>
+              <a:pPr algn="l"/>
+              <a:r>
+                <a:rPr lang="en-US" altLang="zh-CN" sz="1400" dirty="0">
+                  <a:latin typeface="Consolas" panose="020B0609020204030204" pitchFamily="49" charset="0"/>
+                </a:rPr>
+                <a:t>    </a:t>
+              </a:r>
+              <a:r>
+                <a:rPr lang="en-US" altLang="zh-CN" sz="1400" dirty="0">
+                  <a:solidFill>
+                    <a:schemeClr val="accent2">
+                      <a:lumMod val="75000"/>
+                    </a:schemeClr>
+                  </a:solidFill>
+                  <a:latin typeface="Consolas" panose="020B0609020204030204" pitchFamily="49" charset="0"/>
+                </a:rPr>
+                <a:t>right</a:t>
+              </a:r>
+              <a:r>
+                <a:rPr lang="en-US" altLang="zh-CN" sz="1400" dirty="0">
+                  <a:latin typeface="Consolas" panose="020B0609020204030204" pitchFamily="49" charset="0"/>
+                </a:rPr>
+                <a:t> = </a:t>
+              </a:r>
+              <a:r>
+                <a:rPr lang="en-US" altLang="zh-CN" sz="1400" dirty="0">
+                  <a:solidFill>
+                    <a:srgbClr val="00B0F0"/>
+                  </a:solidFill>
+                  <a:latin typeface="Consolas" panose="020B0609020204030204" pitchFamily="49" charset="0"/>
+                </a:rPr>
+                <a:t>mid-&gt;next</a:t>
+              </a:r>
+              <a:r>
+                <a:rPr lang="en-US" altLang="zh-CN" sz="1400" dirty="0">
+                  <a:latin typeface="Consolas" panose="020B0609020204030204" pitchFamily="49" charset="0"/>
+                </a:rPr>
+                <a:t>;</a:t>
+              </a:r>
+            </a:p>
+            <a:p>
+              <a:pPr algn="l"/>
+              <a:r>
+                <a:rPr lang="en-US" altLang="zh-CN" sz="1400" dirty="0">
+                  <a:latin typeface="Consolas" panose="020B0609020204030204" pitchFamily="49" charset="0"/>
+                </a:rPr>
+                <a:t>    </a:t>
+              </a:r>
+              <a:r>
+                <a:rPr lang="en-US" altLang="zh-CN" sz="1400" dirty="0">
+                  <a:solidFill>
+                    <a:srgbClr val="00B0F0"/>
+                  </a:solidFill>
+                  <a:latin typeface="Consolas" panose="020B0609020204030204" pitchFamily="49" charset="0"/>
+                </a:rPr>
+                <a:t>mid-&gt;next </a:t>
+              </a:r>
+              <a:r>
+                <a:rPr lang="en-US" altLang="zh-CN" sz="1400" dirty="0">
+                  <a:latin typeface="Consolas" panose="020B0609020204030204" pitchFamily="49" charset="0"/>
+                </a:rPr>
+                <a:t>= </a:t>
+              </a:r>
+              <a:r>
+                <a:rPr lang="en-US" altLang="zh-CN" sz="1400" dirty="0">
+                  <a:solidFill>
+                    <a:srgbClr val="00B050"/>
+                  </a:solidFill>
+                  <a:latin typeface="Consolas" panose="020B0609020204030204" pitchFamily="49" charset="0"/>
+                </a:rPr>
+                <a:t>left</a:t>
+              </a:r>
+              <a:r>
+                <a:rPr lang="en-US" altLang="zh-CN" sz="1400" dirty="0">
+                  <a:latin typeface="Consolas" panose="020B0609020204030204" pitchFamily="49" charset="0"/>
+                </a:rPr>
+                <a:t>;</a:t>
+              </a:r>
+            </a:p>
+            <a:p>
+              <a:pPr algn="l"/>
+              <a:r>
+                <a:rPr lang="en-US" altLang="zh-CN" sz="1400" dirty="0">
+                  <a:latin typeface="Consolas" panose="020B0609020204030204" pitchFamily="49" charset="0"/>
+                </a:rPr>
+                <a:t>    </a:t>
+              </a:r>
+              <a:r>
+                <a:rPr lang="en-US" altLang="zh-CN" sz="1400" dirty="0">
+                  <a:solidFill>
+                    <a:srgbClr val="00B050"/>
+                  </a:solidFill>
+                  <a:latin typeface="Consolas" panose="020B0609020204030204" pitchFamily="49" charset="0"/>
+                </a:rPr>
+                <a:t>left</a:t>
+              </a:r>
+              <a:r>
+                <a:rPr lang="en-US" altLang="zh-CN" sz="1400" dirty="0">
+                  <a:latin typeface="Consolas" panose="020B0609020204030204" pitchFamily="49" charset="0"/>
+                </a:rPr>
+                <a:t> = </a:t>
+              </a:r>
+              <a:r>
+                <a:rPr lang="en-US" altLang="zh-CN" sz="1400" dirty="0">
+                  <a:solidFill>
+                    <a:schemeClr val="accent1">
+                      <a:lumMod val="75000"/>
+                    </a:schemeClr>
+                  </a:solidFill>
+                  <a:latin typeface="Consolas" panose="020B0609020204030204" pitchFamily="49" charset="0"/>
+                </a:rPr>
+                <a:t>mid</a:t>
+              </a:r>
+              <a:r>
+                <a:rPr lang="en-US" altLang="zh-CN" sz="1400" dirty="0">
+                  <a:latin typeface="Consolas" panose="020B0609020204030204" pitchFamily="49" charset="0"/>
+                </a:rPr>
+                <a:t>;</a:t>
+              </a:r>
+            </a:p>
+            <a:p>
+              <a:pPr algn="l"/>
+              <a:r>
+                <a:rPr lang="en-US" altLang="zh-CN" sz="1400" dirty="0">
+                  <a:latin typeface="Consolas" panose="020B0609020204030204" pitchFamily="49" charset="0"/>
+                </a:rPr>
+                <a:t>    </a:t>
+              </a:r>
+              <a:r>
+                <a:rPr lang="en-US" altLang="zh-CN" sz="1400" dirty="0">
+                  <a:solidFill>
+                    <a:schemeClr val="accent1">
+                      <a:lumMod val="75000"/>
+                    </a:schemeClr>
+                  </a:solidFill>
+                  <a:latin typeface="Consolas" panose="020B0609020204030204" pitchFamily="49" charset="0"/>
+                </a:rPr>
+                <a:t>mid</a:t>
+              </a:r>
+              <a:r>
+                <a:rPr lang="en-US" altLang="zh-CN" sz="1400" dirty="0">
+                  <a:latin typeface="Consolas" panose="020B0609020204030204" pitchFamily="49" charset="0"/>
+                </a:rPr>
+                <a:t> = </a:t>
+              </a:r>
+              <a:r>
+                <a:rPr lang="en-US" altLang="zh-CN" sz="1400" dirty="0">
+                  <a:solidFill>
+                    <a:schemeClr val="accent2">
+                      <a:lumMod val="75000"/>
+                    </a:schemeClr>
+                  </a:solidFill>
+                  <a:latin typeface="Consolas" panose="020B0609020204030204" pitchFamily="49" charset="0"/>
+                </a:rPr>
+                <a:t>right</a:t>
+              </a:r>
+              <a:r>
+                <a:rPr lang="en-US" altLang="zh-CN" sz="1400" dirty="0">
+                  <a:latin typeface="Consolas" panose="020B0609020204030204" pitchFamily="49" charset="0"/>
+                </a:rPr>
+                <a:t>;</a:t>
+              </a:r>
+            </a:p>
+            <a:p>
+              <a:pPr algn="l"/>
+              <a:r>
+                <a:rPr lang="en-US" altLang="zh-CN" sz="1400" dirty="0">
+                  <a:latin typeface="Consolas" panose="020B0609020204030204" pitchFamily="49" charset="0"/>
+                </a:rPr>
+                <a:t>}</a:t>
+              </a:r>
+            </a:p>
+            <a:p>
+              <a:pPr algn="l"/>
+              <a:r>
+                <a:rPr lang="en-US" altLang="zh-CN" sz="1400" dirty="0">
+                  <a:latin typeface="Consolas" panose="020B0609020204030204" pitchFamily="49" charset="0"/>
+                </a:rPr>
+                <a:t>return </a:t>
+              </a:r>
+              <a:r>
+                <a:rPr lang="en-US" altLang="zh-CN" sz="1400" dirty="0">
+                  <a:solidFill>
+                    <a:srgbClr val="00B050"/>
+                  </a:solidFill>
+                  <a:latin typeface="Consolas" panose="020B0609020204030204" pitchFamily="49" charset="0"/>
+                </a:rPr>
+                <a:t>left</a:t>
+              </a:r>
+              <a:r>
+                <a:rPr lang="en-US" altLang="zh-CN" sz="1400" dirty="0">
+                  <a:latin typeface="Consolas" panose="020B0609020204030204" pitchFamily="49" charset="0"/>
+                </a:rPr>
+                <a:t>;</a:t>
+              </a:r>
+              <a:endParaRPr lang="zh-CN" altLang="en-US" sz="1400" dirty="0" err="1">
+                <a:latin typeface="Consolas" panose="020B0609020204030204" pitchFamily="49" charset="0"/>
+              </a:endParaRPr>
+            </a:p>
+          </p:txBody>
+        </p:sp>
+        <p:sp>
+          <p:nvSpPr>
+            <p:cNvPr id="205" name="文本框 204">
+              <a:extLst>
+                <a:ext uri="{FF2B5EF4-FFF2-40B4-BE49-F238E27FC236}">
+                  <a16:creationId xmlns:a16="http://schemas.microsoft.com/office/drawing/2014/main" id="{91F9D03F-F43E-4D1E-948C-605476057B22}"/>
+                </a:ext>
+              </a:extLst>
+            </p:cNvPr>
+            <p:cNvSpPr txBox="1"/>
+            <p:nvPr/>
+          </p:nvSpPr>
+          <p:spPr>
+            <a:xfrm>
+              <a:off x="1899340" y="5051929"/>
+              <a:ext cx="493784" cy="276999"/>
+            </a:xfrm>
+            <a:prstGeom prst="rect">
+              <a:avLst/>
+            </a:prstGeom>
+            <a:noFill/>
+          </p:spPr>
+          <p:txBody>
+            <a:bodyPr wrap="square" rtlCol="0">
+              <a:spAutoFit/>
+            </a:bodyPr>
+            <a:lstStyle/>
+            <a:p>
+              <a:pPr algn="ctr"/>
+              <a:r>
+                <a:rPr lang="zh-CN" altLang="en-US" sz="1200" dirty="0">
+                  <a:latin typeface="Times New Roman" panose="02020603050405020304" pitchFamily="18" charset="0"/>
+                  <a:ea typeface="宋体" panose="02010600030101010101" pitchFamily="2" charset="-122"/>
+                </a:rPr>
+                <a:t>①</a:t>
+              </a:r>
+            </a:p>
+          </p:txBody>
+        </p:sp>
+        <p:sp>
+          <p:nvSpPr>
+            <p:cNvPr id="206" name="文本框 205">
+              <a:extLst>
+                <a:ext uri="{FF2B5EF4-FFF2-40B4-BE49-F238E27FC236}">
+                  <a16:creationId xmlns:a16="http://schemas.microsoft.com/office/drawing/2014/main" id="{8A036DC7-20F2-4360-BB71-8A4626926FC7}"/>
+                </a:ext>
+              </a:extLst>
+            </p:cNvPr>
+            <p:cNvSpPr txBox="1"/>
+            <p:nvPr/>
+          </p:nvSpPr>
+          <p:spPr>
+            <a:xfrm>
+              <a:off x="1899340" y="5268857"/>
+              <a:ext cx="493784" cy="276999"/>
+            </a:xfrm>
+            <a:prstGeom prst="rect">
+              <a:avLst/>
+            </a:prstGeom>
+            <a:noFill/>
+          </p:spPr>
+          <p:txBody>
+            <a:bodyPr wrap="square" rtlCol="0">
+              <a:spAutoFit/>
+            </a:bodyPr>
+            <a:lstStyle/>
+            <a:p>
+              <a:pPr algn="ctr"/>
+              <a:r>
+                <a:rPr lang="zh-CN" altLang="en-US" sz="1200" dirty="0">
+                  <a:latin typeface="Times New Roman" panose="02020603050405020304" pitchFamily="18" charset="0"/>
+                  <a:ea typeface="宋体" panose="02010600030101010101" pitchFamily="2" charset="-122"/>
+                </a:rPr>
+                <a:t>②</a:t>
+              </a:r>
+            </a:p>
+          </p:txBody>
+        </p:sp>
+        <p:sp>
+          <p:nvSpPr>
+            <p:cNvPr id="207" name="文本框 206">
+              <a:extLst>
+                <a:ext uri="{FF2B5EF4-FFF2-40B4-BE49-F238E27FC236}">
+                  <a16:creationId xmlns:a16="http://schemas.microsoft.com/office/drawing/2014/main" id="{9B3E8FFD-1F2A-4345-BB0A-77020957E929}"/>
+                </a:ext>
+              </a:extLst>
+            </p:cNvPr>
+            <p:cNvSpPr txBox="1"/>
+            <p:nvPr/>
+          </p:nvSpPr>
+          <p:spPr>
+            <a:xfrm>
+              <a:off x="1899340" y="5485785"/>
+              <a:ext cx="493784" cy="276999"/>
+            </a:xfrm>
+            <a:prstGeom prst="rect">
+              <a:avLst/>
+            </a:prstGeom>
+            <a:noFill/>
+          </p:spPr>
+          <p:txBody>
+            <a:bodyPr wrap="square" rtlCol="0">
+              <a:spAutoFit/>
+            </a:bodyPr>
+            <a:lstStyle/>
+            <a:p>
+              <a:pPr algn="ctr"/>
+              <a:r>
+                <a:rPr lang="zh-CN" altLang="en-US" sz="1200" dirty="0">
+                  <a:latin typeface="Times New Roman" panose="02020603050405020304" pitchFamily="18" charset="0"/>
+                  <a:ea typeface="宋体" panose="02010600030101010101" pitchFamily="2" charset="-122"/>
+                </a:rPr>
+                <a:t>③</a:t>
+              </a:r>
+            </a:p>
+          </p:txBody>
+        </p:sp>
+        <p:sp>
+          <p:nvSpPr>
+            <p:cNvPr id="208" name="文本框 207">
+              <a:extLst>
+                <a:ext uri="{FF2B5EF4-FFF2-40B4-BE49-F238E27FC236}">
+                  <a16:creationId xmlns:a16="http://schemas.microsoft.com/office/drawing/2014/main" id="{06F88CC2-7EA4-4F54-B6E0-C5A734DA5702}"/>
+                </a:ext>
+              </a:extLst>
+            </p:cNvPr>
+            <p:cNvSpPr txBox="1"/>
+            <p:nvPr/>
+          </p:nvSpPr>
+          <p:spPr>
+            <a:xfrm>
+              <a:off x="1899340" y="5703354"/>
+              <a:ext cx="493784" cy="276999"/>
+            </a:xfrm>
+            <a:prstGeom prst="rect">
+              <a:avLst/>
+            </a:prstGeom>
+            <a:noFill/>
+          </p:spPr>
+          <p:txBody>
+            <a:bodyPr wrap="square" rtlCol="0">
+              <a:spAutoFit/>
+            </a:bodyPr>
+            <a:lstStyle/>
+            <a:p>
+              <a:pPr algn="ctr"/>
+              <a:r>
+                <a:rPr lang="zh-CN" altLang="en-US" sz="1200" dirty="0">
+                  <a:latin typeface="Times New Roman" panose="02020603050405020304" pitchFamily="18" charset="0"/>
+                  <a:ea typeface="宋体" panose="02010600030101010101" pitchFamily="2" charset="-122"/>
+                </a:rPr>
+                <a:t>④</a:t>
+              </a:r>
+            </a:p>
+          </p:txBody>
+        </p:sp>
+        <p:sp>
+          <p:nvSpPr>
+            <p:cNvPr id="209" name="文本框 208">
+              <a:extLst>
+                <a:ext uri="{FF2B5EF4-FFF2-40B4-BE49-F238E27FC236}">
+                  <a16:creationId xmlns:a16="http://schemas.microsoft.com/office/drawing/2014/main" id="{3B642909-249B-4EB3-8059-ACC5B2C21E5F}"/>
+                </a:ext>
+              </a:extLst>
+            </p:cNvPr>
+            <p:cNvSpPr txBox="1"/>
+            <p:nvPr/>
+          </p:nvSpPr>
+          <p:spPr>
+            <a:xfrm>
+              <a:off x="1619681" y="5051929"/>
+              <a:ext cx="493784" cy="276999"/>
+            </a:xfrm>
+            <a:prstGeom prst="rect">
+              <a:avLst/>
+            </a:prstGeom>
+            <a:noFill/>
+          </p:spPr>
+          <p:txBody>
+            <a:bodyPr wrap="square" rtlCol="0">
+              <a:spAutoFit/>
+            </a:bodyPr>
+            <a:lstStyle/>
+            <a:p>
+              <a:pPr algn="ctr"/>
+              <a:r>
+                <a:rPr lang="en-US" altLang="zh-CN" sz="1200" dirty="0">
+                  <a:latin typeface="Times New Roman" panose="02020603050405020304" pitchFamily="18" charset="0"/>
+                  <a:ea typeface="宋体" panose="02010600030101010101" pitchFamily="2" charset="-122"/>
+                </a:rPr>
+                <a:t>A</a:t>
+              </a:r>
+              <a:endParaRPr lang="zh-CN" altLang="en-US" sz="1200" dirty="0">
+                <a:latin typeface="Times New Roman" panose="02020603050405020304" pitchFamily="18" charset="0"/>
+                <a:ea typeface="宋体" panose="02010600030101010101" pitchFamily="2" charset="-122"/>
+              </a:endParaRPr>
+            </a:p>
+          </p:txBody>
+        </p:sp>
+        <p:sp>
+          <p:nvSpPr>
+            <p:cNvPr id="210" name="文本框 209">
+              <a:extLst>
+                <a:ext uri="{FF2B5EF4-FFF2-40B4-BE49-F238E27FC236}">
+                  <a16:creationId xmlns:a16="http://schemas.microsoft.com/office/drawing/2014/main" id="{2C4639EC-9D69-4C75-BFF1-F934AE9D2547}"/>
+                </a:ext>
+              </a:extLst>
+            </p:cNvPr>
+            <p:cNvSpPr txBox="1"/>
+            <p:nvPr/>
+          </p:nvSpPr>
+          <p:spPr>
+            <a:xfrm>
+              <a:off x="1619681" y="5268857"/>
+              <a:ext cx="493784" cy="276999"/>
+            </a:xfrm>
+            <a:prstGeom prst="rect">
+              <a:avLst/>
+            </a:prstGeom>
+            <a:noFill/>
+          </p:spPr>
+          <p:txBody>
+            <a:bodyPr wrap="square" rtlCol="0">
+              <a:spAutoFit/>
+            </a:bodyPr>
+            <a:lstStyle/>
+            <a:p>
+              <a:pPr algn="ctr"/>
+              <a:r>
+                <a:rPr lang="en-US" altLang="zh-CN" sz="1200" dirty="0">
+                  <a:latin typeface="Times New Roman" panose="02020603050405020304" pitchFamily="18" charset="0"/>
+                  <a:ea typeface="宋体" panose="02010600030101010101" pitchFamily="2" charset="-122"/>
+                </a:rPr>
+                <a:t>B</a:t>
+              </a:r>
+              <a:endParaRPr lang="zh-CN" altLang="en-US" sz="1200" dirty="0">
+                <a:latin typeface="Times New Roman" panose="02020603050405020304" pitchFamily="18" charset="0"/>
+                <a:ea typeface="宋体" panose="02010600030101010101" pitchFamily="2" charset="-122"/>
+              </a:endParaRPr>
+            </a:p>
+          </p:txBody>
+        </p:sp>
+        <p:sp>
+          <p:nvSpPr>
+            <p:cNvPr id="211" name="文本框 210">
+              <a:extLst>
+                <a:ext uri="{FF2B5EF4-FFF2-40B4-BE49-F238E27FC236}">
+                  <a16:creationId xmlns:a16="http://schemas.microsoft.com/office/drawing/2014/main" id="{6B3189A1-E018-4372-B33E-AF970EA1F603}"/>
+                </a:ext>
+              </a:extLst>
+            </p:cNvPr>
+            <p:cNvSpPr txBox="1"/>
+            <p:nvPr/>
+          </p:nvSpPr>
+          <p:spPr>
+            <a:xfrm>
+              <a:off x="1619681" y="5485785"/>
+              <a:ext cx="493784" cy="276999"/>
+            </a:xfrm>
+            <a:prstGeom prst="rect">
+              <a:avLst/>
+            </a:prstGeom>
+            <a:noFill/>
+          </p:spPr>
+          <p:txBody>
+            <a:bodyPr wrap="square" rtlCol="0">
+              <a:spAutoFit/>
+            </a:bodyPr>
+            <a:lstStyle/>
+            <a:p>
+              <a:pPr algn="ctr"/>
+              <a:r>
+                <a:rPr lang="en-US" altLang="zh-CN" sz="1200" dirty="0">
+                  <a:latin typeface="Times New Roman" panose="02020603050405020304" pitchFamily="18" charset="0"/>
+                  <a:ea typeface="宋体" panose="02010600030101010101" pitchFamily="2" charset="-122"/>
+                </a:rPr>
+                <a:t>C</a:t>
+              </a:r>
+              <a:endParaRPr lang="zh-CN" altLang="en-US" sz="1200" dirty="0">
+                <a:latin typeface="Times New Roman" panose="02020603050405020304" pitchFamily="18" charset="0"/>
+                <a:ea typeface="宋体" panose="02010600030101010101" pitchFamily="2" charset="-122"/>
+              </a:endParaRPr>
+            </a:p>
+          </p:txBody>
+        </p:sp>
+        <p:sp>
+          <p:nvSpPr>
+            <p:cNvPr id="212" name="文本框 211">
+              <a:extLst>
+                <a:ext uri="{FF2B5EF4-FFF2-40B4-BE49-F238E27FC236}">
+                  <a16:creationId xmlns:a16="http://schemas.microsoft.com/office/drawing/2014/main" id="{6065246F-2AF2-472C-B697-2958C01E41E3}"/>
+                </a:ext>
+              </a:extLst>
+            </p:cNvPr>
+            <p:cNvSpPr txBox="1"/>
+            <p:nvPr/>
+          </p:nvSpPr>
+          <p:spPr>
+            <a:xfrm>
+              <a:off x="1619681" y="5703354"/>
+              <a:ext cx="493784" cy="276999"/>
+            </a:xfrm>
+            <a:prstGeom prst="rect">
+              <a:avLst/>
+            </a:prstGeom>
+            <a:noFill/>
+          </p:spPr>
+          <p:txBody>
+            <a:bodyPr wrap="square" rtlCol="0">
+              <a:spAutoFit/>
+            </a:bodyPr>
+            <a:lstStyle/>
+            <a:p>
+              <a:pPr algn="ctr"/>
+              <a:r>
+                <a:rPr lang="en-US" altLang="zh-CN" sz="1200" dirty="0">
+                  <a:latin typeface="Times New Roman" panose="02020603050405020304" pitchFamily="18" charset="0"/>
+                  <a:ea typeface="宋体" panose="02010600030101010101" pitchFamily="2" charset="-122"/>
+                </a:rPr>
+                <a:t>D</a:t>
+              </a:r>
+              <a:endParaRPr lang="zh-CN" altLang="en-US" sz="1200" dirty="0">
+                <a:latin typeface="Times New Roman" panose="02020603050405020304" pitchFamily="18" charset="0"/>
+                <a:ea typeface="宋体" panose="02010600030101010101" pitchFamily="2" charset="-122"/>
+              </a:endParaRPr>
+            </a:p>
+          </p:txBody>
+        </p:sp>
+      </p:grpSp>
+    </p:spTree>
+    <p:extLst>
+      <p:ext uri="{BB962C8B-B14F-4D97-AF65-F5344CB8AC3E}">
+        <p14:creationId xmlns:p14="http://schemas.microsoft.com/office/powerpoint/2010/main" val="1235419359"/>
+      </p:ext>
+    </p:extLst>
+  </p:cSld>
+  <p:clrMapOvr>
+    <a:masterClrMapping/>
+  </p:clrMapOvr>
+</p:sld>
+</file>
+
 <file path=ppt/theme/theme1.xml><?xml version="1.0" encoding="utf-8"?>
 <a:theme xmlns:a="http://schemas.openxmlformats.org/drawingml/2006/main" name="Office 主题​​">
   <a:themeElements>

</xml_diff>